<commit_message>
Added more Tableau lecture content
</commit_message>
<xml_diff>
--- a/lecture05.more.viz/lecture05.viz.pptx
+++ b/lecture05.more.viz/lecture05.viz.pptx
@@ -38,10 +38,16 @@
     <p:sldId id="282" r:id="rId32"/>
     <p:sldId id="269" r:id="rId33"/>
     <p:sldId id="295" r:id="rId34"/>
-    <p:sldId id="270" r:id="rId35"/>
-    <p:sldId id="296" r:id="rId36"/>
-    <p:sldId id="297" r:id="rId37"/>
-    <p:sldId id="298" r:id="rId38"/>
+    <p:sldId id="299" r:id="rId35"/>
+    <p:sldId id="300" r:id="rId36"/>
+    <p:sldId id="302" r:id="rId37"/>
+    <p:sldId id="301" r:id="rId38"/>
+    <p:sldId id="304" r:id="rId39"/>
+    <p:sldId id="303" r:id="rId40"/>
+    <p:sldId id="270" r:id="rId41"/>
+    <p:sldId id="296" r:id="rId42"/>
+    <p:sldId id="297" r:id="rId43"/>
+    <p:sldId id="298" r:id="rId44"/>
   </p:sldIdLst>
   <p:sldSz cx="12192000" cy="6858000"/>
   <p:notesSz cx="6858000" cy="9144000"/>
@@ -16439,6 +16445,13 @@
   <p:clrMapOvr>
     <a:masterClrMapping/>
   </p:clrMapOvr>
+  <p:timing>
+    <p:tnLst>
+      <p:par>
+        <p:cTn id="1" dur="indefinite" restart="never" nodeType="tmRoot"/>
+      </p:par>
+    </p:tnLst>
+  </p:timing>
 </p:sld>
 </file>
 
@@ -16475,10 +16488,10 @@
           <a:lstStyle/>
           <a:p>
             <a:r>
-              <a:rPr lang="en-US" smtClean="0"/>
-              <a:t>Agenda</a:t>
-            </a:r>
-            <a:endParaRPr lang="en-US"/>
+              <a:rPr lang="en-US" dirty="0" smtClean="0"/>
+              <a:t>Data Ingestion</a:t>
+            </a:r>
+            <a:endParaRPr lang="en-US" dirty="0"/>
           </a:p>
         </p:txBody>
       </p:sp>
@@ -16498,43 +16511,520 @@
           <a:lstStyle/>
           <a:p>
             <a:r>
-              <a:rPr lang="en-US" dirty="0" err="1" smtClean="0"/>
-              <a:t>Matplotlib</a:t>
-            </a:r>
-            <a:endParaRPr lang="en-US" dirty="0" smtClean="0"/>
-          </a:p>
-          <a:p>
-            <a:r>
-              <a:rPr lang="en-US" dirty="0" err="1" smtClean="0"/>
-              <a:t>Bokeh</a:t>
-            </a:r>
-            <a:endParaRPr lang="en-US" dirty="0" smtClean="0"/>
-          </a:p>
-          <a:p>
-            <a:r>
               <a:rPr lang="en-US" dirty="0" smtClean="0"/>
-              <a:t>Tableau</a:t>
-            </a:r>
-          </a:p>
-          <a:p>
-            <a:r>
-              <a:rPr lang="en-US" b="1" dirty="0" smtClean="0"/>
-              <a:t>Final Project</a:t>
-            </a:r>
-            <a:endParaRPr lang="en-US" b="1" dirty="0"/>
+              <a:t>Joins: inner, left, right, full</a:t>
+            </a:r>
+          </a:p>
+          <a:p>
+            <a:r>
+              <a:rPr lang="en-US" dirty="0" smtClean="0"/>
+              <a:t>Extract – Transform – Load (ETL)</a:t>
+            </a:r>
+          </a:p>
+          <a:p>
+            <a:r>
+              <a:rPr lang="en-US" dirty="0" smtClean="0"/>
+              <a:t>Field Transformation</a:t>
+            </a:r>
+          </a:p>
+          <a:p>
+            <a:r>
+              <a:rPr lang="en-US" dirty="0" smtClean="0"/>
+              <a:t>Live / Extract</a:t>
+            </a:r>
+          </a:p>
+          <a:p>
+            <a:r>
+              <a:rPr lang="en-US" dirty="0" smtClean="0"/>
+              <a:t>Filtering</a:t>
+            </a:r>
+          </a:p>
+          <a:p>
+            <a:r>
+              <a:rPr lang="en-US" dirty="0" smtClean="0"/>
+              <a:t>Large dataset &amp; role of Tableau</a:t>
+            </a:r>
+            <a:endParaRPr lang="en-US" dirty="0"/>
           </a:p>
         </p:txBody>
       </p:sp>
+      <p:pic>
+        <p:nvPicPr>
+          <p:cNvPr id="4" name="Picture 3"/>
+          <p:cNvPicPr>
+            <a:picLocks noChangeAspect="1"/>
+          </p:cNvPicPr>
+          <p:nvPr/>
+        </p:nvPicPr>
+        <p:blipFill>
+          <a:blip r:embed="rId2">
+            <a:extLst>
+              <a:ext uri="{28A0092B-C50C-407E-A947-70E740481C1C}">
+                <a14:useLocalDpi xmlns:a14="http://schemas.microsoft.com/office/drawing/2010/main" val="0"/>
+              </a:ext>
+            </a:extLst>
+          </a:blip>
+          <a:stretch>
+            <a:fillRect/>
+          </a:stretch>
+        </p:blipFill>
+        <p:spPr>
+          <a:xfrm>
+            <a:off x="6438900" y="1825625"/>
+            <a:ext cx="4914900" cy="787400"/>
+          </a:xfrm>
+          <a:prstGeom prst="rect">
+            <a:avLst/>
+          </a:prstGeom>
+          <a:effectLst>
+            <a:softEdge rad="25400"/>
+          </a:effectLst>
+        </p:spPr>
+      </p:pic>
     </p:spTree>
     <p:extLst>
       <p:ext uri="{BB962C8B-B14F-4D97-AF65-F5344CB8AC3E}">
-        <p14:creationId xmlns:p14="http://schemas.microsoft.com/office/powerpoint/2010/main" val="1294073009"/>
+        <p14:creationId xmlns:p14="http://schemas.microsoft.com/office/powerpoint/2010/main" val="1022252941"/>
       </p:ext>
     </p:extLst>
   </p:cSld>
   <p:clrMapOvr>
     <a:masterClrMapping/>
   </p:clrMapOvr>
+  <p:timing>
+    <p:tnLst>
+      <p:par>
+        <p:cTn id="1" dur="indefinite" restart="never" nodeType="tmRoot">
+          <p:childTnLst>
+            <p:seq concurrent="1" nextAc="seek">
+              <p:cTn id="2" dur="indefinite" nodeType="mainSeq">
+                <p:childTnLst>
+                  <p:par>
+                    <p:cTn id="3" fill="hold">
+                      <p:stCondLst>
+                        <p:cond delay="indefinite"/>
+                      </p:stCondLst>
+                      <p:childTnLst>
+                        <p:par>
+                          <p:cTn id="4" fill="hold">
+                            <p:stCondLst>
+                              <p:cond delay="0"/>
+                            </p:stCondLst>
+                            <p:childTnLst>
+                              <p:par>
+                                <p:cTn id="5" presetID="3" presetClass="entr" presetSubtype="10" fill="hold" grpId="0" nodeType="clickEffect">
+                                  <p:stCondLst>
+                                    <p:cond delay="0"/>
+                                  </p:stCondLst>
+                                  <p:childTnLst>
+                                    <p:set>
+                                      <p:cBhvr>
+                                        <p:cTn id="6" dur="1" fill="hold">
+                                          <p:stCondLst>
+                                            <p:cond delay="0"/>
+                                          </p:stCondLst>
+                                        </p:cTn>
+                                        <p:tgtEl>
+                                          <p:spTgt spid="3">
+                                            <p:txEl>
+                                              <p:pRg st="0" end="0"/>
+                                            </p:txEl>
+                                          </p:spTgt>
+                                        </p:tgtEl>
+                                        <p:attrNameLst>
+                                          <p:attrName>style.visibility</p:attrName>
+                                        </p:attrNameLst>
+                                      </p:cBhvr>
+                                      <p:to>
+                                        <p:strVal val="visible"/>
+                                      </p:to>
+                                    </p:set>
+                                    <p:animEffect transition="in" filter="blinds(horizontal)">
+                                      <p:cBhvr>
+                                        <p:cTn id="7" dur="500"/>
+                                        <p:tgtEl>
+                                          <p:spTgt spid="3">
+                                            <p:txEl>
+                                              <p:pRg st="0" end="0"/>
+                                            </p:txEl>
+                                          </p:spTgt>
+                                        </p:tgtEl>
+                                      </p:cBhvr>
+                                    </p:animEffect>
+                                  </p:childTnLst>
+                                </p:cTn>
+                              </p:par>
+                              <p:par>
+                                <p:cTn id="8" presetID="3" presetClass="entr" presetSubtype="10" fill="hold" nodeType="withEffect">
+                                  <p:stCondLst>
+                                    <p:cond delay="0"/>
+                                  </p:stCondLst>
+                                  <p:childTnLst>
+                                    <p:set>
+                                      <p:cBhvr>
+                                        <p:cTn id="9" dur="1" fill="hold">
+                                          <p:stCondLst>
+                                            <p:cond delay="0"/>
+                                          </p:stCondLst>
+                                        </p:cTn>
+                                        <p:tgtEl>
+                                          <p:spTgt spid="4"/>
+                                        </p:tgtEl>
+                                        <p:attrNameLst>
+                                          <p:attrName>style.visibility</p:attrName>
+                                        </p:attrNameLst>
+                                      </p:cBhvr>
+                                      <p:to>
+                                        <p:strVal val="visible"/>
+                                      </p:to>
+                                    </p:set>
+                                    <p:animEffect transition="in" filter="blinds(horizontal)">
+                                      <p:cBhvr>
+                                        <p:cTn id="10" dur="500"/>
+                                        <p:tgtEl>
+                                          <p:spTgt spid="4"/>
+                                        </p:tgtEl>
+                                      </p:cBhvr>
+                                    </p:animEffect>
+                                  </p:childTnLst>
+                                </p:cTn>
+                              </p:par>
+                            </p:childTnLst>
+                          </p:cTn>
+                        </p:par>
+                      </p:childTnLst>
+                    </p:cTn>
+                  </p:par>
+                  <p:par>
+                    <p:cTn id="11" fill="hold">
+                      <p:stCondLst>
+                        <p:cond delay="indefinite"/>
+                      </p:stCondLst>
+                      <p:childTnLst>
+                        <p:par>
+                          <p:cTn id="12" fill="hold">
+                            <p:stCondLst>
+                              <p:cond delay="0"/>
+                            </p:stCondLst>
+                            <p:childTnLst>
+                              <p:par>
+                                <p:cTn id="13" presetID="3" presetClass="entr" presetSubtype="10" fill="hold" grpId="0" nodeType="clickEffect">
+                                  <p:stCondLst>
+                                    <p:cond delay="0"/>
+                                  </p:stCondLst>
+                                  <p:childTnLst>
+                                    <p:set>
+                                      <p:cBhvr>
+                                        <p:cTn id="14" dur="1" fill="hold">
+                                          <p:stCondLst>
+                                            <p:cond delay="0"/>
+                                          </p:stCondLst>
+                                        </p:cTn>
+                                        <p:tgtEl>
+                                          <p:spTgt spid="3">
+                                            <p:txEl>
+                                              <p:pRg st="1" end="1"/>
+                                            </p:txEl>
+                                          </p:spTgt>
+                                        </p:tgtEl>
+                                        <p:attrNameLst>
+                                          <p:attrName>style.visibility</p:attrName>
+                                        </p:attrNameLst>
+                                      </p:cBhvr>
+                                      <p:to>
+                                        <p:strVal val="visible"/>
+                                      </p:to>
+                                    </p:set>
+                                    <p:animEffect transition="in" filter="blinds(horizontal)">
+                                      <p:cBhvr>
+                                        <p:cTn id="15" dur="500"/>
+                                        <p:tgtEl>
+                                          <p:spTgt spid="3">
+                                            <p:txEl>
+                                              <p:pRg st="1" end="1"/>
+                                            </p:txEl>
+                                          </p:spTgt>
+                                        </p:tgtEl>
+                                      </p:cBhvr>
+                                    </p:animEffect>
+                                  </p:childTnLst>
+                                </p:cTn>
+                              </p:par>
+                            </p:childTnLst>
+                          </p:cTn>
+                        </p:par>
+                      </p:childTnLst>
+                    </p:cTn>
+                  </p:par>
+                  <p:par>
+                    <p:cTn id="16" fill="hold">
+                      <p:stCondLst>
+                        <p:cond delay="indefinite"/>
+                      </p:stCondLst>
+                      <p:childTnLst>
+                        <p:par>
+                          <p:cTn id="17" fill="hold">
+                            <p:stCondLst>
+                              <p:cond delay="0"/>
+                            </p:stCondLst>
+                            <p:childTnLst>
+                              <p:par>
+                                <p:cTn id="18" presetID="3" presetClass="entr" presetSubtype="10" fill="hold" grpId="0" nodeType="clickEffect">
+                                  <p:stCondLst>
+                                    <p:cond delay="0"/>
+                                  </p:stCondLst>
+                                  <p:childTnLst>
+                                    <p:set>
+                                      <p:cBhvr>
+                                        <p:cTn id="19" dur="1" fill="hold">
+                                          <p:stCondLst>
+                                            <p:cond delay="0"/>
+                                          </p:stCondLst>
+                                        </p:cTn>
+                                        <p:tgtEl>
+                                          <p:spTgt spid="3">
+                                            <p:txEl>
+                                              <p:pRg st="2" end="2"/>
+                                            </p:txEl>
+                                          </p:spTgt>
+                                        </p:tgtEl>
+                                        <p:attrNameLst>
+                                          <p:attrName>style.visibility</p:attrName>
+                                        </p:attrNameLst>
+                                      </p:cBhvr>
+                                      <p:to>
+                                        <p:strVal val="visible"/>
+                                      </p:to>
+                                    </p:set>
+                                    <p:animEffect transition="in" filter="blinds(horizontal)">
+                                      <p:cBhvr>
+                                        <p:cTn id="20" dur="500"/>
+                                        <p:tgtEl>
+                                          <p:spTgt spid="3">
+                                            <p:txEl>
+                                              <p:pRg st="2" end="2"/>
+                                            </p:txEl>
+                                          </p:spTgt>
+                                        </p:tgtEl>
+                                      </p:cBhvr>
+                                    </p:animEffect>
+                                  </p:childTnLst>
+                                </p:cTn>
+                              </p:par>
+                            </p:childTnLst>
+                          </p:cTn>
+                        </p:par>
+                      </p:childTnLst>
+                    </p:cTn>
+                  </p:par>
+                  <p:par>
+                    <p:cTn id="21" fill="hold">
+                      <p:stCondLst>
+                        <p:cond delay="indefinite"/>
+                      </p:stCondLst>
+                      <p:childTnLst>
+                        <p:par>
+                          <p:cTn id="22" fill="hold">
+                            <p:stCondLst>
+                              <p:cond delay="0"/>
+                            </p:stCondLst>
+                            <p:childTnLst>
+                              <p:par>
+                                <p:cTn id="23" presetID="3" presetClass="entr" presetSubtype="10" fill="hold" grpId="0" nodeType="clickEffect">
+                                  <p:stCondLst>
+                                    <p:cond delay="0"/>
+                                  </p:stCondLst>
+                                  <p:childTnLst>
+                                    <p:set>
+                                      <p:cBhvr>
+                                        <p:cTn id="24" dur="1" fill="hold">
+                                          <p:stCondLst>
+                                            <p:cond delay="0"/>
+                                          </p:stCondLst>
+                                        </p:cTn>
+                                        <p:tgtEl>
+                                          <p:spTgt spid="3">
+                                            <p:txEl>
+                                              <p:pRg st="3" end="3"/>
+                                            </p:txEl>
+                                          </p:spTgt>
+                                        </p:tgtEl>
+                                        <p:attrNameLst>
+                                          <p:attrName>style.visibility</p:attrName>
+                                        </p:attrNameLst>
+                                      </p:cBhvr>
+                                      <p:to>
+                                        <p:strVal val="visible"/>
+                                      </p:to>
+                                    </p:set>
+                                    <p:animEffect transition="in" filter="blinds(horizontal)">
+                                      <p:cBhvr>
+                                        <p:cTn id="25" dur="500"/>
+                                        <p:tgtEl>
+                                          <p:spTgt spid="3">
+                                            <p:txEl>
+                                              <p:pRg st="3" end="3"/>
+                                            </p:txEl>
+                                          </p:spTgt>
+                                        </p:tgtEl>
+                                      </p:cBhvr>
+                                    </p:animEffect>
+                                  </p:childTnLst>
+                                </p:cTn>
+                              </p:par>
+                            </p:childTnLst>
+                          </p:cTn>
+                        </p:par>
+                      </p:childTnLst>
+                    </p:cTn>
+                  </p:par>
+                  <p:par>
+                    <p:cTn id="26" fill="hold">
+                      <p:stCondLst>
+                        <p:cond delay="indefinite"/>
+                      </p:stCondLst>
+                      <p:childTnLst>
+                        <p:par>
+                          <p:cTn id="27" fill="hold">
+                            <p:stCondLst>
+                              <p:cond delay="0"/>
+                            </p:stCondLst>
+                            <p:childTnLst>
+                              <p:par>
+                                <p:cTn id="28" presetID="3" presetClass="entr" presetSubtype="10" fill="hold" grpId="0" nodeType="clickEffect">
+                                  <p:stCondLst>
+                                    <p:cond delay="0"/>
+                                  </p:stCondLst>
+                                  <p:childTnLst>
+                                    <p:set>
+                                      <p:cBhvr>
+                                        <p:cTn id="29" dur="1" fill="hold">
+                                          <p:stCondLst>
+                                            <p:cond delay="0"/>
+                                          </p:stCondLst>
+                                        </p:cTn>
+                                        <p:tgtEl>
+                                          <p:spTgt spid="3">
+                                            <p:txEl>
+                                              <p:pRg st="4" end="4"/>
+                                            </p:txEl>
+                                          </p:spTgt>
+                                        </p:tgtEl>
+                                        <p:attrNameLst>
+                                          <p:attrName>style.visibility</p:attrName>
+                                        </p:attrNameLst>
+                                      </p:cBhvr>
+                                      <p:to>
+                                        <p:strVal val="visible"/>
+                                      </p:to>
+                                    </p:set>
+                                    <p:animEffect transition="in" filter="blinds(horizontal)">
+                                      <p:cBhvr>
+                                        <p:cTn id="30" dur="500"/>
+                                        <p:tgtEl>
+                                          <p:spTgt spid="3">
+                                            <p:txEl>
+                                              <p:pRg st="4" end="4"/>
+                                            </p:txEl>
+                                          </p:spTgt>
+                                        </p:tgtEl>
+                                      </p:cBhvr>
+                                    </p:animEffect>
+                                  </p:childTnLst>
+                                </p:cTn>
+                              </p:par>
+                            </p:childTnLst>
+                          </p:cTn>
+                        </p:par>
+                      </p:childTnLst>
+                    </p:cTn>
+                  </p:par>
+                  <p:par>
+                    <p:cTn id="31" fill="hold">
+                      <p:stCondLst>
+                        <p:cond delay="indefinite"/>
+                      </p:stCondLst>
+                      <p:childTnLst>
+                        <p:par>
+                          <p:cTn id="32" fill="hold">
+                            <p:stCondLst>
+                              <p:cond delay="0"/>
+                            </p:stCondLst>
+                            <p:childTnLst>
+                              <p:par>
+                                <p:cTn id="33" presetID="3" presetClass="entr" presetSubtype="10" fill="hold" grpId="0" nodeType="clickEffect">
+                                  <p:stCondLst>
+                                    <p:cond delay="0"/>
+                                  </p:stCondLst>
+                                  <p:childTnLst>
+                                    <p:set>
+                                      <p:cBhvr>
+                                        <p:cTn id="34" dur="1" fill="hold">
+                                          <p:stCondLst>
+                                            <p:cond delay="0"/>
+                                          </p:stCondLst>
+                                        </p:cTn>
+                                        <p:tgtEl>
+                                          <p:spTgt spid="3">
+                                            <p:txEl>
+                                              <p:pRg st="5" end="5"/>
+                                            </p:txEl>
+                                          </p:spTgt>
+                                        </p:tgtEl>
+                                        <p:attrNameLst>
+                                          <p:attrName>style.visibility</p:attrName>
+                                        </p:attrNameLst>
+                                      </p:cBhvr>
+                                      <p:to>
+                                        <p:strVal val="visible"/>
+                                      </p:to>
+                                    </p:set>
+                                    <p:animEffect transition="in" filter="blinds(horizontal)">
+                                      <p:cBhvr>
+                                        <p:cTn id="35" dur="500"/>
+                                        <p:tgtEl>
+                                          <p:spTgt spid="3">
+                                            <p:txEl>
+                                              <p:pRg st="5" end="5"/>
+                                            </p:txEl>
+                                          </p:spTgt>
+                                        </p:tgtEl>
+                                      </p:cBhvr>
+                                    </p:animEffect>
+                                  </p:childTnLst>
+                                </p:cTn>
+                              </p:par>
+                            </p:childTnLst>
+                          </p:cTn>
+                        </p:par>
+                      </p:childTnLst>
+                    </p:cTn>
+                  </p:par>
+                </p:childTnLst>
+              </p:cTn>
+              <p:prevCondLst>
+                <p:cond evt="onPrev" delay="0">
+                  <p:tgtEl>
+                    <p:sldTgt/>
+                  </p:tgtEl>
+                </p:cond>
+              </p:prevCondLst>
+              <p:nextCondLst>
+                <p:cond evt="onNext" delay="0">
+                  <p:tgtEl>
+                    <p:sldTgt/>
+                  </p:tgtEl>
+                </p:cond>
+              </p:nextCondLst>
+            </p:seq>
+          </p:childTnLst>
+        </p:cTn>
+      </p:par>
+    </p:tnLst>
+    <p:bldLst>
+      <p:bldP spid="3" grpId="0" uiExpand="1" build="p"/>
+    </p:bldLst>
+  </p:timing>
 </p:sld>
 </file>
 
@@ -16572,7 +17062,7 @@
           <a:p>
             <a:r>
               <a:rPr lang="en-US" dirty="0" smtClean="0"/>
-              <a:t>Your final project : guidelines</a:t>
+              <a:t>Dimensions &amp; Measures</a:t>
             </a:r>
             <a:endParaRPr lang="en-US" dirty="0"/>
           </a:p>
@@ -16588,86 +17078,350 @@
             <p:ph idx="1"/>
           </p:nvPr>
         </p:nvSpPr>
-        <p:spPr/>
+        <p:spPr>
+          <a:xfrm>
+            <a:off x="838200" y="1825625"/>
+            <a:ext cx="4917141" cy="4351338"/>
+          </a:xfrm>
+        </p:spPr>
         <p:txBody>
           <a:bodyPr/>
           <a:lstStyle/>
           <a:p>
             <a:r>
               <a:rPr lang="en-US" dirty="0" smtClean="0"/>
-              <a:t>Goal: </a:t>
-            </a:r>
-            <a:r>
-              <a:rPr lang="en-US" b="1" dirty="0" smtClean="0"/>
-              <a:t>apply</a:t>
-            </a:r>
-            <a:r>
+              <a:t>Dimensions : categorical </a:t>
+            </a:r>
+            <a:br>
               <a:rPr lang="en-US" dirty="0" smtClean="0"/>
-              <a:t> what you have learned in this class to a realistic data science challenge </a:t>
-            </a:r>
+            </a:br>
             <a:r>
               <a:rPr lang="en-US" dirty="0" smtClean="0"/>
-              <a:t>+ exercise your creativity + have fun!</a:t>
-            </a:r>
+              <a:t/>
+            </a:r>
+            <a:br>
+              <a:rPr lang="en-US" dirty="0" smtClean="0"/>
+            </a:br>
+            <a:r>
+              <a:rPr lang="en-US" dirty="0" smtClean="0"/>
+              <a:t/>
+            </a:r>
+            <a:br>
+              <a:rPr lang="en-US" dirty="0" smtClean="0"/>
+            </a:br>
+            <a:r>
+              <a:rPr lang="en-US" dirty="0" smtClean="0"/>
+              <a:t/>
+            </a:r>
+            <a:br>
+              <a:rPr lang="en-US" dirty="0" smtClean="0"/>
+            </a:br>
             <a:endParaRPr lang="en-US" dirty="0" smtClean="0"/>
           </a:p>
           <a:p>
             <a:r>
               <a:rPr lang="en-US" dirty="0" smtClean="0"/>
-              <a:t>This is meant to be a significant </a:t>
-            </a:r>
-            <a:r>
-              <a:rPr lang="en-US" b="1" dirty="0" smtClean="0"/>
-              <a:t>individual effort </a:t>
-            </a:r>
-            <a:r>
-              <a:rPr lang="en-US" dirty="0" smtClean="0"/>
-              <a:t>to learn by practicing what you are learning to a real-world data science problem.</a:t>
-            </a:r>
-          </a:p>
-          <a:p>
-            <a:r>
-              <a:rPr lang="en-US" dirty="0" smtClean="0"/>
-              <a:t>The </a:t>
-            </a:r>
-            <a:r>
-              <a:rPr lang="en-US" b="1" dirty="0" err="1" smtClean="0"/>
-              <a:t>writeup</a:t>
-            </a:r>
-            <a:r>
-              <a:rPr lang="en-US" dirty="0" smtClean="0"/>
-              <a:t> of your final project is in the form of a </a:t>
-            </a:r>
-            <a:r>
-              <a:rPr lang="en-US" dirty="0" err="1" smtClean="0"/>
-              <a:t>Jupyter</a:t>
-            </a:r>
-            <a:r>
-              <a:rPr lang="en-US" dirty="0" smtClean="0"/>
-              <a:t> notebook and associated data – to be uploaded to the final project assignment in Camino.</a:t>
-            </a:r>
-          </a:p>
-          <a:p>
-            <a:r>
-              <a:rPr lang="en-US" dirty="0" smtClean="0"/>
-              <a:t>You are to submit your final notebook by September 3 @ 11:59pm.</a:t>
-            </a:r>
-          </a:p>
-          <a:p>
+              <a:t>Measures : numerical</a:t>
+            </a:r>
             <a:endParaRPr lang="en-US" dirty="0"/>
           </a:p>
         </p:txBody>
       </p:sp>
+      <p:pic>
+        <p:nvPicPr>
+          <p:cNvPr id="4" name="Picture 3"/>
+          <p:cNvPicPr>
+            <a:picLocks noChangeAspect="1"/>
+          </p:cNvPicPr>
+          <p:nvPr/>
+        </p:nvPicPr>
+        <p:blipFill>
+          <a:blip r:embed="rId2">
+            <a:extLst>
+              <a:ext uri="{28A0092B-C50C-407E-A947-70E740481C1C}">
+                <a14:useLocalDpi xmlns:a14="http://schemas.microsoft.com/office/drawing/2010/main" val="0"/>
+              </a:ext>
+            </a:extLst>
+          </a:blip>
+          <a:stretch>
+            <a:fillRect/>
+          </a:stretch>
+        </p:blipFill>
+        <p:spPr>
+          <a:xfrm>
+            <a:off x="5200575" y="1690688"/>
+            <a:ext cx="2552700" cy="3492500"/>
+          </a:xfrm>
+          <a:prstGeom prst="rect">
+            <a:avLst/>
+          </a:prstGeom>
+        </p:spPr>
+      </p:pic>
+      <p:pic>
+        <p:nvPicPr>
+          <p:cNvPr id="5" name="Picture 4"/>
+          <p:cNvPicPr>
+            <a:picLocks noChangeAspect="1"/>
+          </p:cNvPicPr>
+          <p:nvPr/>
+        </p:nvPicPr>
+        <p:blipFill>
+          <a:blip r:embed="rId3">
+            <a:extLst>
+              <a:ext uri="{28A0092B-C50C-407E-A947-70E740481C1C}">
+                <a14:useLocalDpi xmlns:a14="http://schemas.microsoft.com/office/drawing/2010/main" val="0"/>
+              </a:ext>
+            </a:extLst>
+          </a:blip>
+          <a:stretch>
+            <a:fillRect/>
+          </a:stretch>
+        </p:blipFill>
+        <p:spPr>
+          <a:xfrm>
+            <a:off x="8089900" y="3766802"/>
+            <a:ext cx="2540000" cy="2324100"/>
+          </a:xfrm>
+          <a:prstGeom prst="rect">
+            <a:avLst/>
+          </a:prstGeom>
+        </p:spPr>
+      </p:pic>
     </p:spTree>
     <p:extLst>
       <p:ext uri="{BB962C8B-B14F-4D97-AF65-F5344CB8AC3E}">
-        <p14:creationId xmlns:p14="http://schemas.microsoft.com/office/powerpoint/2010/main" val="953952999"/>
+        <p14:creationId xmlns:p14="http://schemas.microsoft.com/office/powerpoint/2010/main" val="2067422670"/>
       </p:ext>
     </p:extLst>
   </p:cSld>
   <p:clrMapOvr>
     <a:masterClrMapping/>
   </p:clrMapOvr>
+  <p:timing>
+    <p:tnLst>
+      <p:par>
+        <p:cTn id="1" dur="indefinite" restart="never" nodeType="tmRoot">
+          <p:childTnLst>
+            <p:seq concurrent="1" nextAc="seek">
+              <p:cTn id="2" dur="indefinite" nodeType="mainSeq">
+                <p:childTnLst>
+                  <p:par>
+                    <p:cTn id="3" fill="hold">
+                      <p:stCondLst>
+                        <p:cond delay="indefinite"/>
+                      </p:stCondLst>
+                      <p:childTnLst>
+                        <p:par>
+                          <p:cTn id="4" fill="hold">
+                            <p:stCondLst>
+                              <p:cond delay="0"/>
+                            </p:stCondLst>
+                            <p:childTnLst>
+                              <p:par>
+                                <p:cTn id="5" presetID="3" presetClass="entr" presetSubtype="10" fill="hold" grpId="0" nodeType="clickEffect">
+                                  <p:stCondLst>
+                                    <p:cond delay="0"/>
+                                  </p:stCondLst>
+                                  <p:childTnLst>
+                                    <p:set>
+                                      <p:cBhvr>
+                                        <p:cTn id="6" dur="1" fill="hold">
+                                          <p:stCondLst>
+                                            <p:cond delay="0"/>
+                                          </p:stCondLst>
+                                        </p:cTn>
+                                        <p:tgtEl>
+                                          <p:spTgt spid="3">
+                                            <p:txEl>
+                                              <p:pRg st="0" end="0"/>
+                                            </p:txEl>
+                                          </p:spTgt>
+                                        </p:tgtEl>
+                                        <p:attrNameLst>
+                                          <p:attrName>style.visibility</p:attrName>
+                                        </p:attrNameLst>
+                                      </p:cBhvr>
+                                      <p:to>
+                                        <p:strVal val="visible"/>
+                                      </p:to>
+                                    </p:set>
+                                    <p:animEffect transition="in" filter="blinds(horizontal)">
+                                      <p:cBhvr>
+                                        <p:cTn id="7" dur="500"/>
+                                        <p:tgtEl>
+                                          <p:spTgt spid="3">
+                                            <p:txEl>
+                                              <p:pRg st="0" end="0"/>
+                                            </p:txEl>
+                                          </p:spTgt>
+                                        </p:tgtEl>
+                                      </p:cBhvr>
+                                    </p:animEffect>
+                                  </p:childTnLst>
+                                </p:cTn>
+                              </p:par>
+                              <p:par>
+                                <p:cTn id="8" presetID="3" presetClass="entr" presetSubtype="10" fill="hold" nodeType="withEffect">
+                                  <p:stCondLst>
+                                    <p:cond delay="0"/>
+                                  </p:stCondLst>
+                                  <p:childTnLst>
+                                    <p:set>
+                                      <p:cBhvr>
+                                        <p:cTn id="9" dur="1" fill="hold">
+                                          <p:stCondLst>
+                                            <p:cond delay="0"/>
+                                          </p:stCondLst>
+                                        </p:cTn>
+                                        <p:tgtEl>
+                                          <p:spTgt spid="4"/>
+                                        </p:tgtEl>
+                                        <p:attrNameLst>
+                                          <p:attrName>style.visibility</p:attrName>
+                                        </p:attrNameLst>
+                                      </p:cBhvr>
+                                      <p:to>
+                                        <p:strVal val="visible"/>
+                                      </p:to>
+                                    </p:set>
+                                    <p:animEffect transition="in" filter="blinds(horizontal)">
+                                      <p:cBhvr>
+                                        <p:cTn id="10" dur="500"/>
+                                        <p:tgtEl>
+                                          <p:spTgt spid="4"/>
+                                        </p:tgtEl>
+                                      </p:cBhvr>
+                                    </p:animEffect>
+                                  </p:childTnLst>
+                                </p:cTn>
+                              </p:par>
+                            </p:childTnLst>
+                          </p:cTn>
+                        </p:par>
+                      </p:childTnLst>
+                    </p:cTn>
+                  </p:par>
+                  <p:par>
+                    <p:cTn id="11" fill="hold">
+                      <p:stCondLst>
+                        <p:cond delay="indefinite"/>
+                      </p:stCondLst>
+                      <p:childTnLst>
+                        <p:par>
+                          <p:cTn id="12" fill="hold">
+                            <p:stCondLst>
+                              <p:cond delay="0"/>
+                            </p:stCondLst>
+                            <p:childTnLst>
+                              <p:par>
+                                <p:cTn id="13" presetID="3" presetClass="entr" presetSubtype="10" fill="hold" grpId="0" nodeType="clickEffect">
+                                  <p:stCondLst>
+                                    <p:cond delay="0"/>
+                                  </p:stCondLst>
+                                  <p:childTnLst>
+                                    <p:set>
+                                      <p:cBhvr>
+                                        <p:cTn id="14" dur="1" fill="hold">
+                                          <p:stCondLst>
+                                            <p:cond delay="0"/>
+                                          </p:stCondLst>
+                                        </p:cTn>
+                                        <p:tgtEl>
+                                          <p:spTgt spid="3">
+                                            <p:txEl>
+                                              <p:pRg st="1" end="1"/>
+                                            </p:txEl>
+                                          </p:spTgt>
+                                        </p:tgtEl>
+                                        <p:attrNameLst>
+                                          <p:attrName>style.visibility</p:attrName>
+                                        </p:attrNameLst>
+                                      </p:cBhvr>
+                                      <p:to>
+                                        <p:strVal val="visible"/>
+                                      </p:to>
+                                    </p:set>
+                                    <p:animEffect transition="in" filter="blinds(horizontal)">
+                                      <p:cBhvr>
+                                        <p:cTn id="15" dur="500"/>
+                                        <p:tgtEl>
+                                          <p:spTgt spid="3">
+                                            <p:txEl>
+                                              <p:pRg st="1" end="1"/>
+                                            </p:txEl>
+                                          </p:spTgt>
+                                        </p:tgtEl>
+                                      </p:cBhvr>
+                                    </p:animEffect>
+                                  </p:childTnLst>
+                                </p:cTn>
+                              </p:par>
+                              <p:par>
+                                <p:cTn id="16" presetID="3" presetClass="entr" presetSubtype="10" fill="hold" nodeType="withEffect">
+                                  <p:stCondLst>
+                                    <p:cond delay="0"/>
+                                  </p:stCondLst>
+                                  <p:childTnLst>
+                                    <p:set>
+                                      <p:cBhvr>
+                                        <p:cTn id="17" dur="1" fill="hold">
+                                          <p:stCondLst>
+                                            <p:cond delay="0"/>
+                                          </p:stCondLst>
+                                        </p:cTn>
+                                        <p:tgtEl>
+                                          <p:spTgt spid="5"/>
+                                        </p:tgtEl>
+                                        <p:attrNameLst>
+                                          <p:attrName>style.visibility</p:attrName>
+                                        </p:attrNameLst>
+                                      </p:cBhvr>
+                                      <p:to>
+                                        <p:strVal val="visible"/>
+                                      </p:to>
+                                    </p:set>
+                                    <p:animEffect transition="in" filter="blinds(horizontal)">
+                                      <p:cBhvr>
+                                        <p:cTn id="18" dur="500"/>
+                                        <p:tgtEl>
+                                          <p:spTgt spid="5"/>
+                                        </p:tgtEl>
+                                      </p:cBhvr>
+                                    </p:animEffect>
+                                  </p:childTnLst>
+                                </p:cTn>
+                              </p:par>
+                            </p:childTnLst>
+                          </p:cTn>
+                        </p:par>
+                      </p:childTnLst>
+                    </p:cTn>
+                  </p:par>
+                </p:childTnLst>
+              </p:cTn>
+              <p:prevCondLst>
+                <p:cond evt="onPrev" delay="0">
+                  <p:tgtEl>
+                    <p:sldTgt/>
+                  </p:tgtEl>
+                </p:cond>
+              </p:prevCondLst>
+              <p:nextCondLst>
+                <p:cond evt="onNext" delay="0">
+                  <p:tgtEl>
+                    <p:sldTgt/>
+                  </p:tgtEl>
+                </p:cond>
+              </p:nextCondLst>
+            </p:seq>
+          </p:childTnLst>
+        </p:cTn>
+      </p:par>
+    </p:tnLst>
+    <p:bldLst>
+      <p:bldP spid="3" grpId="0" uiExpand="1" build="p"/>
+    </p:bldLst>
+  </p:timing>
 </p:sld>
 </file>
 
@@ -16705,7 +17459,276 @@
           <a:p>
             <a:r>
               <a:rPr lang="en-US" dirty="0" smtClean="0"/>
-              <a:t>Your final project : topic selection</a:t>
+              <a:t>Rows &amp; Columns</a:t>
+            </a:r>
+            <a:endParaRPr lang="en-US" dirty="0"/>
+          </a:p>
+        </p:txBody>
+      </p:sp>
+      <p:pic>
+        <p:nvPicPr>
+          <p:cNvPr id="4" name="Content Placeholder 3"/>
+          <p:cNvPicPr>
+            <a:picLocks noGrp="1" noChangeAspect="1"/>
+          </p:cNvPicPr>
+          <p:nvPr>
+            <p:ph idx="1"/>
+          </p:nvPr>
+        </p:nvPicPr>
+        <p:blipFill>
+          <a:blip r:embed="rId2">
+            <a:extLst>
+              <a:ext uri="{28A0092B-C50C-407E-A947-70E740481C1C}">
+                <a14:useLocalDpi xmlns:a14="http://schemas.microsoft.com/office/drawing/2010/main" val="0"/>
+              </a:ext>
+            </a:extLst>
+          </a:blip>
+          <a:stretch>
+            <a:fillRect/>
+          </a:stretch>
+        </p:blipFill>
+        <p:spPr>
+          <a:xfrm>
+            <a:off x="4427763" y="2245065"/>
+            <a:ext cx="3119665" cy="3476642"/>
+          </a:xfrm>
+        </p:spPr>
+      </p:pic>
+    </p:spTree>
+    <p:extLst>
+      <p:ext uri="{BB962C8B-B14F-4D97-AF65-F5344CB8AC3E}">
+        <p14:creationId xmlns:p14="http://schemas.microsoft.com/office/powerpoint/2010/main" val="1150911235"/>
+      </p:ext>
+    </p:extLst>
+  </p:cSld>
+  <p:clrMapOvr>
+    <a:masterClrMapping/>
+  </p:clrMapOvr>
+  <p:timing>
+    <p:tnLst>
+      <p:par>
+        <p:cTn id="1" dur="indefinite" restart="never" nodeType="tmRoot"/>
+      </p:par>
+    </p:tnLst>
+  </p:timing>
+</p:sld>
+</file>
+
+<file path=ppt/slides/slide37.xml><?xml version="1.0" encoding="utf-8"?>
+<p:sld xmlns:a="http://schemas.openxmlformats.org/drawingml/2006/main" xmlns:r="http://schemas.openxmlformats.org/officeDocument/2006/relationships" xmlns:p="http://schemas.openxmlformats.org/presentationml/2006/main">
+  <p:cSld>
+    <p:spTree>
+      <p:nvGrpSpPr>
+        <p:cNvPr id="1" name=""/>
+        <p:cNvGrpSpPr/>
+        <p:nvPr/>
+      </p:nvGrpSpPr>
+      <p:grpSpPr>
+        <a:xfrm>
+          <a:off x="0" y="0"/>
+          <a:ext cx="0" cy="0"/>
+          <a:chOff x="0" y="0"/>
+          <a:chExt cx="0" cy="0"/>
+        </a:xfrm>
+      </p:grpSpPr>
+      <p:sp>
+        <p:nvSpPr>
+          <p:cNvPr id="2" name="Title 1"/>
+          <p:cNvSpPr>
+            <a:spLocks noGrp="1"/>
+          </p:cNvSpPr>
+          <p:nvPr>
+            <p:ph type="title"/>
+          </p:nvPr>
+        </p:nvSpPr>
+        <p:spPr/>
+        <p:txBody>
+          <a:bodyPr/>
+          <a:lstStyle/>
+          <a:p>
+            <a:r>
+              <a:rPr lang="en-US" dirty="0" smtClean="0"/>
+              <a:t>Marks</a:t>
+            </a:r>
+            <a:endParaRPr lang="en-US" dirty="0"/>
+          </a:p>
+        </p:txBody>
+      </p:sp>
+      <p:pic>
+        <p:nvPicPr>
+          <p:cNvPr id="4" name="Picture 3"/>
+          <p:cNvPicPr>
+            <a:picLocks noChangeAspect="1"/>
+          </p:cNvPicPr>
+          <p:nvPr/>
+        </p:nvPicPr>
+        <p:blipFill>
+          <a:blip r:embed="rId2">
+            <a:extLst>
+              <a:ext uri="{28A0092B-C50C-407E-A947-70E740481C1C}">
+                <a14:useLocalDpi xmlns:a14="http://schemas.microsoft.com/office/drawing/2010/main" val="0"/>
+              </a:ext>
+            </a:extLst>
+          </a:blip>
+          <a:stretch>
+            <a:fillRect/>
+          </a:stretch>
+        </p:blipFill>
+        <p:spPr>
+          <a:xfrm>
+            <a:off x="4134757" y="2307771"/>
+            <a:ext cx="2919186" cy="2881999"/>
+          </a:xfrm>
+          <a:prstGeom prst="rect">
+            <a:avLst/>
+          </a:prstGeom>
+        </p:spPr>
+      </p:pic>
+    </p:spTree>
+    <p:extLst>
+      <p:ext uri="{BB962C8B-B14F-4D97-AF65-F5344CB8AC3E}">
+        <p14:creationId xmlns:p14="http://schemas.microsoft.com/office/powerpoint/2010/main" val="1932428806"/>
+      </p:ext>
+    </p:extLst>
+  </p:cSld>
+  <p:clrMapOvr>
+    <a:masterClrMapping/>
+  </p:clrMapOvr>
+  <p:timing>
+    <p:tnLst>
+      <p:par>
+        <p:cTn id="1" dur="indefinite" restart="never" nodeType="tmRoot"/>
+      </p:par>
+    </p:tnLst>
+  </p:timing>
+</p:sld>
+</file>
+
+<file path=ppt/slides/slide38.xml><?xml version="1.0" encoding="utf-8"?>
+<p:sld xmlns:a="http://schemas.openxmlformats.org/drawingml/2006/main" xmlns:r="http://schemas.openxmlformats.org/officeDocument/2006/relationships" xmlns:p="http://schemas.openxmlformats.org/presentationml/2006/main">
+  <p:cSld>
+    <p:spTree>
+      <p:nvGrpSpPr>
+        <p:cNvPr id="1" name=""/>
+        <p:cNvGrpSpPr/>
+        <p:nvPr/>
+      </p:nvGrpSpPr>
+      <p:grpSpPr>
+        <a:xfrm>
+          <a:off x="0" y="0"/>
+          <a:ext cx="0" cy="0"/>
+          <a:chOff x="0" y="0"/>
+          <a:chExt cx="0" cy="0"/>
+        </a:xfrm>
+      </p:grpSpPr>
+      <p:sp>
+        <p:nvSpPr>
+          <p:cNvPr id="2" name="Title 1"/>
+          <p:cNvSpPr>
+            <a:spLocks noGrp="1"/>
+          </p:cNvSpPr>
+          <p:nvPr>
+            <p:ph type="title"/>
+          </p:nvPr>
+        </p:nvSpPr>
+        <p:spPr/>
+        <p:txBody>
+          <a:bodyPr/>
+          <a:lstStyle/>
+          <a:p>
+            <a:r>
+              <a:rPr lang="en-US" dirty="0" smtClean="0"/>
+              <a:t>Multi-level Analysis</a:t>
+            </a:r>
+            <a:endParaRPr lang="en-US" dirty="0"/>
+          </a:p>
+        </p:txBody>
+      </p:sp>
+      <p:pic>
+        <p:nvPicPr>
+          <p:cNvPr id="4" name="Picture 3"/>
+          <p:cNvPicPr>
+            <a:picLocks noChangeAspect="1"/>
+          </p:cNvPicPr>
+          <p:nvPr/>
+        </p:nvPicPr>
+        <p:blipFill>
+          <a:blip r:embed="rId2">
+            <a:extLst>
+              <a:ext uri="{28A0092B-C50C-407E-A947-70E740481C1C}">
+                <a14:useLocalDpi xmlns:a14="http://schemas.microsoft.com/office/drawing/2010/main" val="0"/>
+              </a:ext>
+            </a:extLst>
+          </a:blip>
+          <a:stretch>
+            <a:fillRect/>
+          </a:stretch>
+        </p:blipFill>
+        <p:spPr>
+          <a:xfrm>
+            <a:off x="3245756" y="1534886"/>
+            <a:ext cx="6101443" cy="5063888"/>
+          </a:xfrm>
+          <a:prstGeom prst="rect">
+            <a:avLst/>
+          </a:prstGeom>
+        </p:spPr>
+      </p:pic>
+    </p:spTree>
+    <p:extLst>
+      <p:ext uri="{BB962C8B-B14F-4D97-AF65-F5344CB8AC3E}">
+        <p14:creationId xmlns:p14="http://schemas.microsoft.com/office/powerpoint/2010/main" val="1002523607"/>
+      </p:ext>
+    </p:extLst>
+  </p:cSld>
+  <p:clrMapOvr>
+    <a:masterClrMapping/>
+  </p:clrMapOvr>
+  <p:timing>
+    <p:tnLst>
+      <p:par>
+        <p:cTn id="1" dur="indefinite" restart="never" nodeType="tmRoot"/>
+      </p:par>
+    </p:tnLst>
+  </p:timing>
+</p:sld>
+</file>
+
+<file path=ppt/slides/slide39.xml><?xml version="1.0" encoding="utf-8"?>
+<p:sld xmlns:a="http://schemas.openxmlformats.org/drawingml/2006/main" xmlns:r="http://schemas.openxmlformats.org/officeDocument/2006/relationships" xmlns:p="http://schemas.openxmlformats.org/presentationml/2006/main">
+  <p:cSld>
+    <p:spTree>
+      <p:nvGrpSpPr>
+        <p:cNvPr id="1" name=""/>
+        <p:cNvGrpSpPr/>
+        <p:nvPr/>
+      </p:nvGrpSpPr>
+      <p:grpSpPr>
+        <a:xfrm>
+          <a:off x="0" y="0"/>
+          <a:ext cx="0" cy="0"/>
+          <a:chOff x="0" y="0"/>
+          <a:chExt cx="0" cy="0"/>
+        </a:xfrm>
+      </p:grpSpPr>
+      <p:sp>
+        <p:nvSpPr>
+          <p:cNvPr id="2" name="Title 1"/>
+          <p:cNvSpPr>
+            <a:spLocks noGrp="1"/>
+          </p:cNvSpPr>
+          <p:nvPr>
+            <p:ph type="title"/>
+          </p:nvPr>
+        </p:nvSpPr>
+        <p:spPr/>
+        <p:txBody>
+          <a:bodyPr/>
+          <a:lstStyle/>
+          <a:p>
+            <a:r>
+              <a:rPr lang="en-US" dirty="0" smtClean="0"/>
+              <a:t>Group Exercise</a:t>
             </a:r>
             <a:endParaRPr lang="en-US" dirty="0"/>
           </a:p>
@@ -16728,6 +17751,1240 @@
           <a:p>
             <a:r>
               <a:rPr lang="en-US" dirty="0" smtClean="0"/>
+              <a:t>Load the “</a:t>
+            </a:r>
+            <a:r>
+              <a:rPr lang="en-US" dirty="0" err="1" smtClean="0"/>
+              <a:t>global_superstore.xls</a:t>
+            </a:r>
+            <a:r>
+              <a:rPr lang="en-US" dirty="0" smtClean="0"/>
+              <a:t>” dataset into Tableau</a:t>
+            </a:r>
+          </a:p>
+          <a:p>
+            <a:r>
+              <a:rPr lang="en-US" dirty="0" smtClean="0"/>
+              <a:t>Answer the following questions:</a:t>
+            </a:r>
+          </a:p>
+          <a:p>
+            <a:pPr marL="914400" lvl="1" indent="-457200">
+              <a:buFont typeface="+mj-lt"/>
+              <a:buAutoNum type="arabicPeriod"/>
+            </a:pPr>
+            <a:r>
+              <a:rPr lang="en-US" dirty="0" smtClean="0"/>
+              <a:t>Which region has the highest sales? </a:t>
+            </a:r>
+          </a:p>
+          <a:p>
+            <a:pPr marL="914400" lvl="1" indent="-457200">
+              <a:buFont typeface="+mj-lt"/>
+              <a:buAutoNum type="arabicPeriod"/>
+            </a:pPr>
+            <a:r>
+              <a:rPr lang="en-US" dirty="0" smtClean="0"/>
+              <a:t>For (1), which product segment for that region has the highest sales?</a:t>
+            </a:r>
+          </a:p>
+          <a:p>
+            <a:pPr marL="914400" lvl="1" indent="-457200">
+              <a:buFont typeface="+mj-lt"/>
+              <a:buAutoNum type="arabicPeriod"/>
+            </a:pPr>
+            <a:r>
+              <a:rPr lang="en-US" dirty="0" smtClean="0"/>
+              <a:t>Regardless of region, which product segment in a given region has the highest sales?	</a:t>
+            </a:r>
+          </a:p>
+          <a:p>
+            <a:r>
+              <a:rPr lang="en-US" smtClean="0"/>
+              <a:t>Take 15 </a:t>
+            </a:r>
+            <a:r>
+              <a:rPr lang="en-US" dirty="0" smtClean="0"/>
+              <a:t>min in your group to decide on extracting </a:t>
+            </a:r>
+            <a:r>
+              <a:rPr lang="en-US" smtClean="0"/>
+              <a:t>an interesting insight from this dataset to present to the class.</a:t>
+            </a:r>
+            <a:endParaRPr lang="en-US" dirty="0"/>
+          </a:p>
+        </p:txBody>
+      </p:sp>
+    </p:spTree>
+    <p:extLst>
+      <p:ext uri="{BB962C8B-B14F-4D97-AF65-F5344CB8AC3E}">
+        <p14:creationId xmlns:p14="http://schemas.microsoft.com/office/powerpoint/2010/main" val="894442370"/>
+      </p:ext>
+    </p:extLst>
+  </p:cSld>
+  <p:clrMapOvr>
+    <a:masterClrMapping/>
+  </p:clrMapOvr>
+  <p:timing>
+    <p:tnLst>
+      <p:par>
+        <p:cTn id="1" dur="indefinite" restart="never" nodeType="tmRoot"/>
+      </p:par>
+    </p:tnLst>
+  </p:timing>
+</p:sld>
+</file>
+
+<file path=ppt/slides/slide4.xml><?xml version="1.0" encoding="utf-8"?>
+<p:sld xmlns:a="http://schemas.openxmlformats.org/drawingml/2006/main" xmlns:r="http://schemas.openxmlformats.org/officeDocument/2006/relationships" xmlns:p="http://schemas.openxmlformats.org/presentationml/2006/main">
+  <p:cSld>
+    <p:spTree>
+      <p:nvGrpSpPr>
+        <p:cNvPr id="1" name=""/>
+        <p:cNvGrpSpPr/>
+        <p:nvPr/>
+      </p:nvGrpSpPr>
+      <p:grpSpPr>
+        <a:xfrm>
+          <a:off x="0" y="0"/>
+          <a:ext cx="0" cy="0"/>
+          <a:chOff x="0" y="0"/>
+          <a:chExt cx="0" cy="0"/>
+        </a:xfrm>
+      </p:grpSpPr>
+      <p:sp>
+        <p:nvSpPr>
+          <p:cNvPr id="2" name="Title 1"/>
+          <p:cNvSpPr>
+            <a:spLocks noGrp="1"/>
+          </p:cNvSpPr>
+          <p:nvPr>
+            <p:ph type="title"/>
+          </p:nvPr>
+        </p:nvSpPr>
+        <p:spPr/>
+        <p:txBody>
+          <a:bodyPr/>
+          <a:lstStyle/>
+          <a:p>
+            <a:r>
+              <a:rPr lang="en-US" dirty="0" smtClean="0"/>
+              <a:t>Anatomy of a </a:t>
+            </a:r>
+            <a:r>
+              <a:rPr lang="en-US" dirty="0" err="1" smtClean="0"/>
+              <a:t>matplotlib</a:t>
+            </a:r>
+            <a:r>
+              <a:rPr lang="en-US" dirty="0" smtClean="0"/>
+              <a:t> plot</a:t>
+            </a:r>
+            <a:endParaRPr lang="en-US" dirty="0"/>
+          </a:p>
+        </p:txBody>
+      </p:sp>
+      <p:sp>
+        <p:nvSpPr>
+          <p:cNvPr id="3" name="Content Placeholder 2"/>
+          <p:cNvSpPr>
+            <a:spLocks noGrp="1"/>
+          </p:cNvSpPr>
+          <p:nvPr>
+            <p:ph idx="1"/>
+          </p:nvPr>
+        </p:nvSpPr>
+        <p:spPr>
+          <a:xfrm>
+            <a:off x="838200" y="1559860"/>
+            <a:ext cx="10515600" cy="5298140"/>
+          </a:xfrm>
+        </p:spPr>
+        <p:txBody>
+          <a:bodyPr>
+            <a:normAutofit fontScale="92500" lnSpcReduction="20000"/>
+          </a:bodyPr>
+          <a:lstStyle/>
+          <a:p>
+            <a:pPr marL="0" indent="0">
+              <a:lnSpc>
+                <a:spcPct val="100000"/>
+              </a:lnSpc>
+              <a:spcBef>
+                <a:spcPts val="0"/>
+              </a:spcBef>
+              <a:buNone/>
+            </a:pPr>
+            <a:r>
+              <a:rPr lang="en-US" dirty="0" smtClean="0">
+                <a:solidFill>
+                  <a:schemeClr val="bg1">
+                    <a:lumMod val="75000"/>
+                  </a:schemeClr>
+                </a:solidFill>
+                <a:latin typeface="Courier New" charset="0"/>
+                <a:ea typeface="Courier New" charset="0"/>
+                <a:cs typeface="Courier New" charset="0"/>
+              </a:rPr>
+              <a:t>import </a:t>
+            </a:r>
+            <a:r>
+              <a:rPr lang="en-US" dirty="0" err="1" smtClean="0">
+                <a:solidFill>
+                  <a:schemeClr val="bg1">
+                    <a:lumMod val="75000"/>
+                  </a:schemeClr>
+                </a:solidFill>
+                <a:latin typeface="Courier New" charset="0"/>
+                <a:ea typeface="Courier New" charset="0"/>
+                <a:cs typeface="Courier New" charset="0"/>
+              </a:rPr>
+              <a:t>numpy</a:t>
+            </a:r>
+            <a:r>
+              <a:rPr lang="en-US" dirty="0" smtClean="0">
+                <a:solidFill>
+                  <a:schemeClr val="bg1">
+                    <a:lumMod val="75000"/>
+                  </a:schemeClr>
+                </a:solidFill>
+                <a:latin typeface="Courier New" charset="0"/>
+                <a:ea typeface="Courier New" charset="0"/>
+                <a:cs typeface="Courier New" charset="0"/>
+              </a:rPr>
+              <a:t> as np </a:t>
+            </a:r>
+          </a:p>
+          <a:p>
+            <a:pPr marL="0" indent="0">
+              <a:lnSpc>
+                <a:spcPct val="100000"/>
+              </a:lnSpc>
+              <a:spcBef>
+                <a:spcPts val="0"/>
+              </a:spcBef>
+              <a:buNone/>
+            </a:pPr>
+            <a:r>
+              <a:rPr lang="en-US" dirty="0" smtClean="0">
+                <a:solidFill>
+                  <a:schemeClr val="bg1">
+                    <a:lumMod val="75000"/>
+                  </a:schemeClr>
+                </a:solidFill>
+                <a:latin typeface="Courier New" charset="0"/>
+                <a:ea typeface="Courier New" charset="0"/>
+                <a:cs typeface="Courier New" charset="0"/>
+              </a:rPr>
+              <a:t>import </a:t>
+            </a:r>
+            <a:r>
+              <a:rPr lang="en-US" dirty="0" err="1" smtClean="0">
+                <a:solidFill>
+                  <a:schemeClr val="bg1">
+                    <a:lumMod val="75000"/>
+                  </a:schemeClr>
+                </a:solidFill>
+                <a:latin typeface="Courier New" charset="0"/>
+                <a:ea typeface="Courier New" charset="0"/>
+                <a:cs typeface="Courier New" charset="0"/>
+              </a:rPr>
+              <a:t>matplotlib.pyplot</a:t>
+            </a:r>
+            <a:r>
+              <a:rPr lang="en-US" dirty="0" smtClean="0">
+                <a:solidFill>
+                  <a:schemeClr val="bg1">
+                    <a:lumMod val="75000"/>
+                  </a:schemeClr>
+                </a:solidFill>
+                <a:latin typeface="Courier New" charset="0"/>
+                <a:ea typeface="Courier New" charset="0"/>
+                <a:cs typeface="Courier New" charset="0"/>
+              </a:rPr>
+              <a:t> as </a:t>
+            </a:r>
+            <a:r>
+              <a:rPr lang="en-US" dirty="0" err="1" smtClean="0">
+                <a:solidFill>
+                  <a:schemeClr val="bg1">
+                    <a:lumMod val="75000"/>
+                  </a:schemeClr>
+                </a:solidFill>
+                <a:latin typeface="Courier New" charset="0"/>
+                <a:ea typeface="Courier New" charset="0"/>
+                <a:cs typeface="Courier New" charset="0"/>
+              </a:rPr>
+              <a:t>plt</a:t>
+            </a:r>
+            <a:r>
+              <a:rPr lang="en-US" dirty="0" smtClean="0">
+                <a:solidFill>
+                  <a:schemeClr val="bg1">
+                    <a:lumMod val="75000"/>
+                  </a:schemeClr>
+                </a:solidFill>
+                <a:latin typeface="Courier New" charset="0"/>
+                <a:ea typeface="Courier New" charset="0"/>
+                <a:cs typeface="Courier New" charset="0"/>
+              </a:rPr>
+              <a:t> </a:t>
+            </a:r>
+          </a:p>
+          <a:p>
+            <a:pPr marL="0" indent="0">
+              <a:lnSpc>
+                <a:spcPct val="100000"/>
+              </a:lnSpc>
+              <a:spcBef>
+                <a:spcPts val="0"/>
+              </a:spcBef>
+              <a:buNone/>
+            </a:pPr>
+            <a:r>
+              <a:rPr lang="en-US" dirty="0" smtClean="0">
+                <a:solidFill>
+                  <a:schemeClr val="bg1">
+                    <a:lumMod val="75000"/>
+                  </a:schemeClr>
+                </a:solidFill>
+                <a:latin typeface="Courier New" charset="0"/>
+                <a:ea typeface="Courier New" charset="0"/>
+                <a:cs typeface="Courier New" charset="0"/>
+              </a:rPr>
+              <a:t>x1 = </a:t>
+            </a:r>
+            <a:r>
+              <a:rPr lang="en-US" dirty="0" err="1" smtClean="0">
+                <a:solidFill>
+                  <a:schemeClr val="bg1">
+                    <a:lumMod val="75000"/>
+                  </a:schemeClr>
+                </a:solidFill>
+                <a:latin typeface="Courier New" charset="0"/>
+                <a:ea typeface="Courier New" charset="0"/>
+                <a:cs typeface="Courier New" charset="0"/>
+              </a:rPr>
+              <a:t>np.linspace</a:t>
+            </a:r>
+            <a:r>
+              <a:rPr lang="en-US" dirty="0" smtClean="0">
+                <a:solidFill>
+                  <a:schemeClr val="bg1">
+                    <a:lumMod val="75000"/>
+                  </a:schemeClr>
+                </a:solidFill>
+                <a:latin typeface="Courier New" charset="0"/>
+                <a:ea typeface="Courier New" charset="0"/>
+                <a:cs typeface="Courier New" charset="0"/>
+              </a:rPr>
+              <a:t>(0.0, 5.0) </a:t>
+            </a:r>
+          </a:p>
+          <a:p>
+            <a:pPr marL="0" indent="0">
+              <a:lnSpc>
+                <a:spcPct val="100000"/>
+              </a:lnSpc>
+              <a:spcBef>
+                <a:spcPts val="0"/>
+              </a:spcBef>
+              <a:buNone/>
+            </a:pPr>
+            <a:r>
+              <a:rPr lang="en-US" dirty="0" smtClean="0">
+                <a:solidFill>
+                  <a:schemeClr val="bg1">
+                    <a:lumMod val="75000"/>
+                  </a:schemeClr>
+                </a:solidFill>
+                <a:latin typeface="Courier New" charset="0"/>
+                <a:ea typeface="Courier New" charset="0"/>
+                <a:cs typeface="Courier New" charset="0"/>
+              </a:rPr>
+              <a:t>x2 = </a:t>
+            </a:r>
+            <a:r>
+              <a:rPr lang="en-US" dirty="0" err="1" smtClean="0">
+                <a:solidFill>
+                  <a:schemeClr val="bg1">
+                    <a:lumMod val="75000"/>
+                  </a:schemeClr>
+                </a:solidFill>
+                <a:latin typeface="Courier New" charset="0"/>
+                <a:ea typeface="Courier New" charset="0"/>
+                <a:cs typeface="Courier New" charset="0"/>
+              </a:rPr>
+              <a:t>np.linspace</a:t>
+            </a:r>
+            <a:r>
+              <a:rPr lang="en-US" dirty="0" smtClean="0">
+                <a:solidFill>
+                  <a:schemeClr val="bg1">
+                    <a:lumMod val="75000"/>
+                  </a:schemeClr>
+                </a:solidFill>
+                <a:latin typeface="Courier New" charset="0"/>
+                <a:ea typeface="Courier New" charset="0"/>
+                <a:cs typeface="Courier New" charset="0"/>
+              </a:rPr>
+              <a:t>(0.0, 2.0) </a:t>
+            </a:r>
+          </a:p>
+          <a:p>
+            <a:pPr marL="0" indent="0">
+              <a:lnSpc>
+                <a:spcPct val="100000"/>
+              </a:lnSpc>
+              <a:spcBef>
+                <a:spcPts val="0"/>
+              </a:spcBef>
+              <a:buNone/>
+            </a:pPr>
+            <a:r>
+              <a:rPr lang="en-US" dirty="0" smtClean="0">
+                <a:solidFill>
+                  <a:schemeClr val="bg1">
+                    <a:lumMod val="75000"/>
+                  </a:schemeClr>
+                </a:solidFill>
+                <a:latin typeface="Courier New" charset="0"/>
+                <a:ea typeface="Courier New" charset="0"/>
+                <a:cs typeface="Courier New" charset="0"/>
+              </a:rPr>
+              <a:t>y1 = </a:t>
+            </a:r>
+            <a:r>
+              <a:rPr lang="en-US" dirty="0" err="1" smtClean="0">
+                <a:solidFill>
+                  <a:schemeClr val="bg1">
+                    <a:lumMod val="75000"/>
+                  </a:schemeClr>
+                </a:solidFill>
+                <a:latin typeface="Courier New" charset="0"/>
+                <a:ea typeface="Courier New" charset="0"/>
+                <a:cs typeface="Courier New" charset="0"/>
+              </a:rPr>
+              <a:t>np.cos</a:t>
+            </a:r>
+            <a:r>
+              <a:rPr lang="en-US" dirty="0" smtClean="0">
+                <a:solidFill>
+                  <a:schemeClr val="bg1">
+                    <a:lumMod val="75000"/>
+                  </a:schemeClr>
+                </a:solidFill>
+                <a:latin typeface="Courier New" charset="0"/>
+                <a:ea typeface="Courier New" charset="0"/>
+                <a:cs typeface="Courier New" charset="0"/>
+              </a:rPr>
+              <a:t>(2 * </a:t>
+            </a:r>
+            <a:r>
+              <a:rPr lang="en-US" dirty="0" err="1" smtClean="0">
+                <a:solidFill>
+                  <a:schemeClr val="bg1">
+                    <a:lumMod val="75000"/>
+                  </a:schemeClr>
+                </a:solidFill>
+                <a:latin typeface="Courier New" charset="0"/>
+                <a:ea typeface="Courier New" charset="0"/>
+                <a:cs typeface="Courier New" charset="0"/>
+              </a:rPr>
+              <a:t>np.pi</a:t>
+            </a:r>
+            <a:r>
+              <a:rPr lang="en-US" dirty="0" smtClean="0">
+                <a:solidFill>
+                  <a:schemeClr val="bg1">
+                    <a:lumMod val="75000"/>
+                  </a:schemeClr>
+                </a:solidFill>
+                <a:latin typeface="Courier New" charset="0"/>
+                <a:ea typeface="Courier New" charset="0"/>
+                <a:cs typeface="Courier New" charset="0"/>
+              </a:rPr>
+              <a:t> * x1) * </a:t>
+            </a:r>
+            <a:r>
+              <a:rPr lang="en-US" dirty="0" err="1" smtClean="0">
+                <a:solidFill>
+                  <a:schemeClr val="bg1">
+                    <a:lumMod val="75000"/>
+                  </a:schemeClr>
+                </a:solidFill>
+                <a:latin typeface="Courier New" charset="0"/>
+                <a:ea typeface="Courier New" charset="0"/>
+                <a:cs typeface="Courier New" charset="0"/>
+              </a:rPr>
+              <a:t>np.exp</a:t>
+            </a:r>
+            <a:r>
+              <a:rPr lang="en-US" dirty="0" smtClean="0">
+                <a:solidFill>
+                  <a:schemeClr val="bg1">
+                    <a:lumMod val="75000"/>
+                  </a:schemeClr>
+                </a:solidFill>
+                <a:latin typeface="Courier New" charset="0"/>
+                <a:ea typeface="Courier New" charset="0"/>
+                <a:cs typeface="Courier New" charset="0"/>
+              </a:rPr>
+              <a:t>(-x1) </a:t>
+            </a:r>
+          </a:p>
+          <a:p>
+            <a:pPr marL="0" indent="0">
+              <a:lnSpc>
+                <a:spcPct val="100000"/>
+              </a:lnSpc>
+              <a:spcBef>
+                <a:spcPts val="0"/>
+              </a:spcBef>
+              <a:buNone/>
+            </a:pPr>
+            <a:r>
+              <a:rPr lang="en-US" dirty="0" smtClean="0">
+                <a:solidFill>
+                  <a:schemeClr val="bg1">
+                    <a:lumMod val="75000"/>
+                  </a:schemeClr>
+                </a:solidFill>
+                <a:latin typeface="Courier New" charset="0"/>
+                <a:ea typeface="Courier New" charset="0"/>
+                <a:cs typeface="Courier New" charset="0"/>
+              </a:rPr>
+              <a:t>y2 = </a:t>
+            </a:r>
+            <a:r>
+              <a:rPr lang="en-US" dirty="0" err="1" smtClean="0">
+                <a:solidFill>
+                  <a:schemeClr val="bg1">
+                    <a:lumMod val="75000"/>
+                  </a:schemeClr>
+                </a:solidFill>
+                <a:latin typeface="Courier New" charset="0"/>
+                <a:ea typeface="Courier New" charset="0"/>
+                <a:cs typeface="Courier New" charset="0"/>
+              </a:rPr>
+              <a:t>np.cos</a:t>
+            </a:r>
+            <a:r>
+              <a:rPr lang="en-US" dirty="0" smtClean="0">
+                <a:solidFill>
+                  <a:schemeClr val="bg1">
+                    <a:lumMod val="75000"/>
+                  </a:schemeClr>
+                </a:solidFill>
+                <a:latin typeface="Courier New" charset="0"/>
+                <a:ea typeface="Courier New" charset="0"/>
+                <a:cs typeface="Courier New" charset="0"/>
+              </a:rPr>
+              <a:t>(2 * </a:t>
+            </a:r>
+            <a:r>
+              <a:rPr lang="en-US" dirty="0" err="1" smtClean="0">
+                <a:solidFill>
+                  <a:schemeClr val="bg1">
+                    <a:lumMod val="75000"/>
+                  </a:schemeClr>
+                </a:solidFill>
+                <a:latin typeface="Courier New" charset="0"/>
+                <a:ea typeface="Courier New" charset="0"/>
+                <a:cs typeface="Courier New" charset="0"/>
+              </a:rPr>
+              <a:t>np.pi</a:t>
+            </a:r>
+            <a:r>
+              <a:rPr lang="en-US" dirty="0" smtClean="0">
+                <a:solidFill>
+                  <a:schemeClr val="bg1">
+                    <a:lumMod val="75000"/>
+                  </a:schemeClr>
+                </a:solidFill>
+                <a:latin typeface="Courier New" charset="0"/>
+                <a:ea typeface="Courier New" charset="0"/>
+                <a:cs typeface="Courier New" charset="0"/>
+              </a:rPr>
+              <a:t> * x2) </a:t>
+            </a:r>
+          </a:p>
+          <a:p>
+            <a:pPr marL="0" indent="0">
+              <a:lnSpc>
+                <a:spcPct val="100000"/>
+              </a:lnSpc>
+              <a:spcBef>
+                <a:spcPts val="0"/>
+              </a:spcBef>
+              <a:buNone/>
+            </a:pPr>
+            <a:r>
+              <a:rPr lang="en-US" dirty="0" err="1" smtClean="0">
+                <a:solidFill>
+                  <a:schemeClr val="bg1">
+                    <a:lumMod val="75000"/>
+                  </a:schemeClr>
+                </a:solidFill>
+                <a:latin typeface="Courier New" charset="0"/>
+                <a:ea typeface="Courier New" charset="0"/>
+                <a:cs typeface="Courier New" charset="0"/>
+              </a:rPr>
+              <a:t>plt.subplot</a:t>
+            </a:r>
+            <a:r>
+              <a:rPr lang="en-US" dirty="0" smtClean="0">
+                <a:solidFill>
+                  <a:schemeClr val="bg1">
+                    <a:lumMod val="75000"/>
+                  </a:schemeClr>
+                </a:solidFill>
+                <a:latin typeface="Courier New" charset="0"/>
+                <a:ea typeface="Courier New" charset="0"/>
+                <a:cs typeface="Courier New" charset="0"/>
+              </a:rPr>
+              <a:t>(2, 1, 1) </a:t>
+            </a:r>
+          </a:p>
+          <a:p>
+            <a:pPr marL="0" indent="0">
+              <a:lnSpc>
+                <a:spcPct val="100000"/>
+              </a:lnSpc>
+              <a:spcBef>
+                <a:spcPts val="0"/>
+              </a:spcBef>
+              <a:buNone/>
+            </a:pPr>
+            <a:r>
+              <a:rPr lang="en-US" dirty="0" err="1" smtClean="0">
+                <a:solidFill>
+                  <a:schemeClr val="bg1">
+                    <a:lumMod val="75000"/>
+                  </a:schemeClr>
+                </a:solidFill>
+                <a:latin typeface="Courier New" charset="0"/>
+                <a:ea typeface="Courier New" charset="0"/>
+                <a:cs typeface="Courier New" charset="0"/>
+              </a:rPr>
+              <a:t>plt.plot</a:t>
+            </a:r>
+            <a:r>
+              <a:rPr lang="en-US" dirty="0" smtClean="0">
+                <a:solidFill>
+                  <a:schemeClr val="bg1">
+                    <a:lumMod val="75000"/>
+                  </a:schemeClr>
+                </a:solidFill>
+                <a:latin typeface="Courier New" charset="0"/>
+                <a:ea typeface="Courier New" charset="0"/>
+                <a:cs typeface="Courier New" charset="0"/>
+              </a:rPr>
+              <a:t>(x1, y1, '</a:t>
+            </a:r>
+            <a:r>
+              <a:rPr lang="en-US" dirty="0" err="1" smtClean="0">
+                <a:solidFill>
+                  <a:schemeClr val="bg1">
+                    <a:lumMod val="75000"/>
+                  </a:schemeClr>
+                </a:solidFill>
+                <a:latin typeface="Courier New" charset="0"/>
+                <a:ea typeface="Courier New" charset="0"/>
+                <a:cs typeface="Courier New" charset="0"/>
+              </a:rPr>
+              <a:t>ko</a:t>
+            </a:r>
+            <a:r>
+              <a:rPr lang="en-US" dirty="0" smtClean="0">
+                <a:solidFill>
+                  <a:schemeClr val="bg1">
+                    <a:lumMod val="75000"/>
+                  </a:schemeClr>
+                </a:solidFill>
+                <a:latin typeface="Courier New" charset="0"/>
+                <a:ea typeface="Courier New" charset="0"/>
+                <a:cs typeface="Courier New" charset="0"/>
+              </a:rPr>
+              <a:t>-') </a:t>
+            </a:r>
+          </a:p>
+          <a:p>
+            <a:pPr marL="0" indent="0">
+              <a:lnSpc>
+                <a:spcPct val="100000"/>
+              </a:lnSpc>
+              <a:spcBef>
+                <a:spcPts val="0"/>
+              </a:spcBef>
+              <a:buNone/>
+            </a:pPr>
+            <a:r>
+              <a:rPr lang="en-US" dirty="0" err="1" smtClean="0">
+                <a:solidFill>
+                  <a:schemeClr val="bg1">
+                    <a:lumMod val="75000"/>
+                  </a:schemeClr>
+                </a:solidFill>
+                <a:latin typeface="Courier New" charset="0"/>
+                <a:ea typeface="Courier New" charset="0"/>
+                <a:cs typeface="Courier New" charset="0"/>
+              </a:rPr>
+              <a:t>plt.title</a:t>
+            </a:r>
+            <a:r>
+              <a:rPr lang="en-US" dirty="0" smtClean="0">
+                <a:solidFill>
+                  <a:schemeClr val="bg1">
+                    <a:lumMod val="75000"/>
+                  </a:schemeClr>
+                </a:solidFill>
+                <a:latin typeface="Courier New" charset="0"/>
+                <a:ea typeface="Courier New" charset="0"/>
+                <a:cs typeface="Courier New" charset="0"/>
+              </a:rPr>
+              <a:t>('A tale of 2 subplots') </a:t>
+            </a:r>
+          </a:p>
+          <a:p>
+            <a:pPr marL="0" indent="0">
+              <a:lnSpc>
+                <a:spcPct val="100000"/>
+              </a:lnSpc>
+              <a:spcBef>
+                <a:spcPts val="0"/>
+              </a:spcBef>
+              <a:buNone/>
+            </a:pPr>
+            <a:r>
+              <a:rPr lang="en-US" dirty="0" err="1" smtClean="0">
+                <a:solidFill>
+                  <a:schemeClr val="bg1">
+                    <a:lumMod val="75000"/>
+                  </a:schemeClr>
+                </a:solidFill>
+                <a:latin typeface="Courier New" charset="0"/>
+                <a:ea typeface="Courier New" charset="0"/>
+                <a:cs typeface="Courier New" charset="0"/>
+              </a:rPr>
+              <a:t>plt.ylabel</a:t>
+            </a:r>
+            <a:r>
+              <a:rPr lang="en-US" dirty="0" smtClean="0">
+                <a:solidFill>
+                  <a:schemeClr val="bg1">
+                    <a:lumMod val="75000"/>
+                  </a:schemeClr>
+                </a:solidFill>
+                <a:latin typeface="Courier New" charset="0"/>
+                <a:ea typeface="Courier New" charset="0"/>
+                <a:cs typeface="Courier New" charset="0"/>
+              </a:rPr>
+              <a:t>('Damped oscillation')</a:t>
+            </a:r>
+          </a:p>
+          <a:p>
+            <a:pPr marL="0" indent="0">
+              <a:lnSpc>
+                <a:spcPct val="100000"/>
+              </a:lnSpc>
+              <a:spcBef>
+                <a:spcPts val="0"/>
+              </a:spcBef>
+              <a:buNone/>
+            </a:pPr>
+            <a:r>
+              <a:rPr lang="en-US" dirty="0" err="1" smtClean="0">
+                <a:solidFill>
+                  <a:schemeClr val="bg1">
+                    <a:lumMod val="75000"/>
+                  </a:schemeClr>
+                </a:solidFill>
+                <a:latin typeface="Courier New" charset="0"/>
+                <a:ea typeface="Courier New" charset="0"/>
+                <a:cs typeface="Courier New" charset="0"/>
+              </a:rPr>
+              <a:t>plt.subplot</a:t>
+            </a:r>
+            <a:r>
+              <a:rPr lang="en-US" dirty="0" smtClean="0">
+                <a:solidFill>
+                  <a:schemeClr val="bg1">
+                    <a:lumMod val="75000"/>
+                  </a:schemeClr>
+                </a:solidFill>
+                <a:latin typeface="Courier New" charset="0"/>
+                <a:ea typeface="Courier New" charset="0"/>
+                <a:cs typeface="Courier New" charset="0"/>
+              </a:rPr>
+              <a:t>(2, 1, 2) </a:t>
+            </a:r>
+          </a:p>
+          <a:p>
+            <a:pPr marL="0" indent="0">
+              <a:lnSpc>
+                <a:spcPct val="100000"/>
+              </a:lnSpc>
+              <a:spcBef>
+                <a:spcPts val="0"/>
+              </a:spcBef>
+              <a:buNone/>
+            </a:pPr>
+            <a:r>
+              <a:rPr lang="en-US" dirty="0" err="1" smtClean="0">
+                <a:solidFill>
+                  <a:schemeClr val="bg1">
+                    <a:lumMod val="75000"/>
+                  </a:schemeClr>
+                </a:solidFill>
+                <a:latin typeface="Courier New" charset="0"/>
+                <a:ea typeface="Courier New" charset="0"/>
+                <a:cs typeface="Courier New" charset="0"/>
+              </a:rPr>
+              <a:t>plt.plot</a:t>
+            </a:r>
+            <a:r>
+              <a:rPr lang="en-US" dirty="0" smtClean="0">
+                <a:solidFill>
+                  <a:schemeClr val="bg1">
+                    <a:lumMod val="75000"/>
+                  </a:schemeClr>
+                </a:solidFill>
+                <a:latin typeface="Courier New" charset="0"/>
+                <a:ea typeface="Courier New" charset="0"/>
+                <a:cs typeface="Courier New" charset="0"/>
+              </a:rPr>
+              <a:t>(x2, y2, 'r.-') </a:t>
+            </a:r>
+          </a:p>
+          <a:p>
+            <a:pPr marL="0" indent="0">
+              <a:lnSpc>
+                <a:spcPct val="100000"/>
+              </a:lnSpc>
+              <a:spcBef>
+                <a:spcPts val="0"/>
+              </a:spcBef>
+              <a:buNone/>
+            </a:pPr>
+            <a:r>
+              <a:rPr lang="en-US" dirty="0" err="1" smtClean="0">
+                <a:solidFill>
+                  <a:schemeClr val="bg1">
+                    <a:lumMod val="75000"/>
+                  </a:schemeClr>
+                </a:solidFill>
+                <a:latin typeface="Courier New" charset="0"/>
+                <a:ea typeface="Courier New" charset="0"/>
+                <a:cs typeface="Courier New" charset="0"/>
+              </a:rPr>
+              <a:t>plt.xlabel</a:t>
+            </a:r>
+            <a:r>
+              <a:rPr lang="en-US" dirty="0" smtClean="0">
+                <a:solidFill>
+                  <a:schemeClr val="bg1">
+                    <a:lumMod val="75000"/>
+                  </a:schemeClr>
+                </a:solidFill>
+                <a:latin typeface="Courier New" charset="0"/>
+                <a:ea typeface="Courier New" charset="0"/>
+                <a:cs typeface="Courier New" charset="0"/>
+              </a:rPr>
+              <a:t>('time (s)') </a:t>
+            </a:r>
+          </a:p>
+          <a:p>
+            <a:pPr marL="0" indent="0">
+              <a:lnSpc>
+                <a:spcPct val="100000"/>
+              </a:lnSpc>
+              <a:spcBef>
+                <a:spcPts val="0"/>
+              </a:spcBef>
+              <a:buNone/>
+            </a:pPr>
+            <a:r>
+              <a:rPr lang="en-US" dirty="0" err="1" smtClean="0">
+                <a:solidFill>
+                  <a:schemeClr val="bg1">
+                    <a:lumMod val="75000"/>
+                  </a:schemeClr>
+                </a:solidFill>
+                <a:latin typeface="Courier New" charset="0"/>
+                <a:ea typeface="Courier New" charset="0"/>
+                <a:cs typeface="Courier New" charset="0"/>
+              </a:rPr>
+              <a:t>plt.ylabel</a:t>
+            </a:r>
+            <a:r>
+              <a:rPr lang="en-US" dirty="0" smtClean="0">
+                <a:solidFill>
+                  <a:schemeClr val="bg1">
+                    <a:lumMod val="75000"/>
+                  </a:schemeClr>
+                </a:solidFill>
+                <a:latin typeface="Courier New" charset="0"/>
+                <a:ea typeface="Courier New" charset="0"/>
+                <a:cs typeface="Courier New" charset="0"/>
+              </a:rPr>
+              <a:t>('Undamped') </a:t>
+            </a:r>
+          </a:p>
+          <a:p>
+            <a:pPr marL="0" indent="0">
+              <a:lnSpc>
+                <a:spcPct val="100000"/>
+              </a:lnSpc>
+              <a:spcBef>
+                <a:spcPts val="0"/>
+              </a:spcBef>
+              <a:buNone/>
+            </a:pPr>
+            <a:r>
+              <a:rPr lang="en-US" dirty="0" err="1" smtClean="0">
+                <a:solidFill>
+                  <a:schemeClr val="bg1">
+                    <a:lumMod val="75000"/>
+                  </a:schemeClr>
+                </a:solidFill>
+                <a:latin typeface="Courier New" charset="0"/>
+                <a:ea typeface="Courier New" charset="0"/>
+                <a:cs typeface="Courier New" charset="0"/>
+              </a:rPr>
+              <a:t>plt.show</a:t>
+            </a:r>
+            <a:r>
+              <a:rPr lang="en-US" dirty="0" smtClean="0">
+                <a:solidFill>
+                  <a:schemeClr val="bg1">
+                    <a:lumMod val="75000"/>
+                  </a:schemeClr>
+                </a:solidFill>
+                <a:latin typeface="Courier New" charset="0"/>
+                <a:ea typeface="Courier New" charset="0"/>
+                <a:cs typeface="Courier New" charset="0"/>
+              </a:rPr>
+              <a:t>()</a:t>
+            </a:r>
+            <a:endParaRPr lang="en-US" dirty="0">
+              <a:solidFill>
+                <a:schemeClr val="bg1">
+                  <a:lumMod val="75000"/>
+                </a:schemeClr>
+              </a:solidFill>
+              <a:latin typeface="Courier New" charset="0"/>
+              <a:ea typeface="Courier New" charset="0"/>
+              <a:cs typeface="Courier New" charset="0"/>
+            </a:endParaRPr>
+          </a:p>
+        </p:txBody>
+      </p:sp>
+    </p:spTree>
+    <p:extLst>
+      <p:ext uri="{BB962C8B-B14F-4D97-AF65-F5344CB8AC3E}">
+        <p14:creationId xmlns:p14="http://schemas.microsoft.com/office/powerpoint/2010/main" val="927731680"/>
+      </p:ext>
+    </p:extLst>
+  </p:cSld>
+  <p:clrMapOvr>
+    <a:masterClrMapping/>
+  </p:clrMapOvr>
+</p:sld>
+</file>
+
+<file path=ppt/slides/slide40.xml><?xml version="1.0" encoding="utf-8"?>
+<p:sld xmlns:a="http://schemas.openxmlformats.org/drawingml/2006/main" xmlns:r="http://schemas.openxmlformats.org/officeDocument/2006/relationships" xmlns:p="http://schemas.openxmlformats.org/presentationml/2006/main">
+  <p:cSld>
+    <p:spTree>
+      <p:nvGrpSpPr>
+        <p:cNvPr id="1" name=""/>
+        <p:cNvGrpSpPr/>
+        <p:nvPr/>
+      </p:nvGrpSpPr>
+      <p:grpSpPr>
+        <a:xfrm>
+          <a:off x="0" y="0"/>
+          <a:ext cx="0" cy="0"/>
+          <a:chOff x="0" y="0"/>
+          <a:chExt cx="0" cy="0"/>
+        </a:xfrm>
+      </p:grpSpPr>
+      <p:sp>
+        <p:nvSpPr>
+          <p:cNvPr id="2" name="Title 1"/>
+          <p:cNvSpPr>
+            <a:spLocks noGrp="1"/>
+          </p:cNvSpPr>
+          <p:nvPr>
+            <p:ph type="title"/>
+          </p:nvPr>
+        </p:nvSpPr>
+        <p:spPr/>
+        <p:txBody>
+          <a:bodyPr/>
+          <a:lstStyle/>
+          <a:p>
+            <a:r>
+              <a:rPr lang="en-US" smtClean="0"/>
+              <a:t>Agenda</a:t>
+            </a:r>
+            <a:endParaRPr lang="en-US"/>
+          </a:p>
+        </p:txBody>
+      </p:sp>
+      <p:sp>
+        <p:nvSpPr>
+          <p:cNvPr id="3" name="Content Placeholder 2"/>
+          <p:cNvSpPr>
+            <a:spLocks noGrp="1"/>
+          </p:cNvSpPr>
+          <p:nvPr>
+            <p:ph idx="1"/>
+          </p:nvPr>
+        </p:nvSpPr>
+        <p:spPr/>
+        <p:txBody>
+          <a:bodyPr/>
+          <a:lstStyle/>
+          <a:p>
+            <a:r>
+              <a:rPr lang="en-US" dirty="0" err="1" smtClean="0"/>
+              <a:t>Matplotlib</a:t>
+            </a:r>
+            <a:endParaRPr lang="en-US" dirty="0" smtClean="0"/>
+          </a:p>
+          <a:p>
+            <a:r>
+              <a:rPr lang="en-US" dirty="0" err="1" smtClean="0"/>
+              <a:t>Bokeh</a:t>
+            </a:r>
+            <a:endParaRPr lang="en-US" dirty="0" smtClean="0"/>
+          </a:p>
+          <a:p>
+            <a:r>
+              <a:rPr lang="en-US" dirty="0" smtClean="0"/>
+              <a:t>Tableau</a:t>
+            </a:r>
+          </a:p>
+          <a:p>
+            <a:r>
+              <a:rPr lang="en-US" b="1" dirty="0" smtClean="0"/>
+              <a:t>Final Project</a:t>
+            </a:r>
+            <a:endParaRPr lang="en-US" b="1" dirty="0"/>
+          </a:p>
+        </p:txBody>
+      </p:sp>
+    </p:spTree>
+    <p:extLst>
+      <p:ext uri="{BB962C8B-B14F-4D97-AF65-F5344CB8AC3E}">
+        <p14:creationId xmlns:p14="http://schemas.microsoft.com/office/powerpoint/2010/main" val="1294073009"/>
+      </p:ext>
+    </p:extLst>
+  </p:cSld>
+  <p:clrMapOvr>
+    <a:masterClrMapping/>
+  </p:clrMapOvr>
+  <p:timing>
+    <p:tnLst>
+      <p:par>
+        <p:cTn id="1" dur="indefinite" restart="never" nodeType="tmRoot"/>
+      </p:par>
+    </p:tnLst>
+  </p:timing>
+</p:sld>
+</file>
+
+<file path=ppt/slides/slide41.xml><?xml version="1.0" encoding="utf-8"?>
+<p:sld xmlns:a="http://schemas.openxmlformats.org/drawingml/2006/main" xmlns:r="http://schemas.openxmlformats.org/officeDocument/2006/relationships" xmlns:p="http://schemas.openxmlformats.org/presentationml/2006/main">
+  <p:cSld>
+    <p:spTree>
+      <p:nvGrpSpPr>
+        <p:cNvPr id="1" name=""/>
+        <p:cNvGrpSpPr/>
+        <p:nvPr/>
+      </p:nvGrpSpPr>
+      <p:grpSpPr>
+        <a:xfrm>
+          <a:off x="0" y="0"/>
+          <a:ext cx="0" cy="0"/>
+          <a:chOff x="0" y="0"/>
+          <a:chExt cx="0" cy="0"/>
+        </a:xfrm>
+      </p:grpSpPr>
+      <p:sp>
+        <p:nvSpPr>
+          <p:cNvPr id="2" name="Title 1"/>
+          <p:cNvSpPr>
+            <a:spLocks noGrp="1"/>
+          </p:cNvSpPr>
+          <p:nvPr>
+            <p:ph type="title"/>
+          </p:nvPr>
+        </p:nvSpPr>
+        <p:spPr/>
+        <p:txBody>
+          <a:bodyPr/>
+          <a:lstStyle/>
+          <a:p>
+            <a:r>
+              <a:rPr lang="en-US" dirty="0" smtClean="0"/>
+              <a:t>Your final project : guidelines</a:t>
+            </a:r>
+            <a:endParaRPr lang="en-US" dirty="0"/>
+          </a:p>
+        </p:txBody>
+      </p:sp>
+      <p:sp>
+        <p:nvSpPr>
+          <p:cNvPr id="3" name="Content Placeholder 2"/>
+          <p:cNvSpPr>
+            <a:spLocks noGrp="1"/>
+          </p:cNvSpPr>
+          <p:nvPr>
+            <p:ph idx="1"/>
+          </p:nvPr>
+        </p:nvSpPr>
+        <p:spPr/>
+        <p:txBody>
+          <a:bodyPr/>
+          <a:lstStyle/>
+          <a:p>
+            <a:r>
+              <a:rPr lang="en-US" dirty="0" smtClean="0"/>
+              <a:t>Goal: </a:t>
+            </a:r>
+            <a:r>
+              <a:rPr lang="en-US" b="1" dirty="0" smtClean="0"/>
+              <a:t>apply</a:t>
+            </a:r>
+            <a:r>
+              <a:rPr lang="en-US" dirty="0" smtClean="0"/>
+              <a:t> what you have learned in this class to a realistic data science challenge </a:t>
+            </a:r>
+            <a:r>
+              <a:rPr lang="en-US" dirty="0" smtClean="0"/>
+              <a:t>+ exercise your creativity + have fun!</a:t>
+            </a:r>
+            <a:endParaRPr lang="en-US" dirty="0" smtClean="0"/>
+          </a:p>
+          <a:p>
+            <a:r>
+              <a:rPr lang="en-US" dirty="0" smtClean="0"/>
+              <a:t>This is meant to be a significant </a:t>
+            </a:r>
+            <a:r>
+              <a:rPr lang="en-US" b="1" dirty="0" smtClean="0"/>
+              <a:t>individual effort </a:t>
+            </a:r>
+            <a:r>
+              <a:rPr lang="en-US" dirty="0" smtClean="0"/>
+              <a:t>to learn by practicing what you are learning to a real-world data science problem.</a:t>
+            </a:r>
+          </a:p>
+          <a:p>
+            <a:r>
+              <a:rPr lang="en-US" dirty="0" smtClean="0"/>
+              <a:t>The </a:t>
+            </a:r>
+            <a:r>
+              <a:rPr lang="en-US" b="1" dirty="0" err="1" smtClean="0"/>
+              <a:t>writeup</a:t>
+            </a:r>
+            <a:r>
+              <a:rPr lang="en-US" dirty="0" smtClean="0"/>
+              <a:t> of your final project is in the form of a </a:t>
+            </a:r>
+            <a:r>
+              <a:rPr lang="en-US" dirty="0" err="1" smtClean="0"/>
+              <a:t>Jupyter</a:t>
+            </a:r>
+            <a:r>
+              <a:rPr lang="en-US" dirty="0" smtClean="0"/>
+              <a:t> notebook and associated data – to be uploaded to the final project assignment in Camino.</a:t>
+            </a:r>
+          </a:p>
+          <a:p>
+            <a:r>
+              <a:rPr lang="en-US" dirty="0" smtClean="0"/>
+              <a:t>You are to submit your final notebook by September 3 @ 11:59pm.</a:t>
+            </a:r>
+          </a:p>
+          <a:p>
+            <a:endParaRPr lang="en-US" dirty="0"/>
+          </a:p>
+        </p:txBody>
+      </p:sp>
+    </p:spTree>
+    <p:extLst>
+      <p:ext uri="{BB962C8B-B14F-4D97-AF65-F5344CB8AC3E}">
+        <p14:creationId xmlns:p14="http://schemas.microsoft.com/office/powerpoint/2010/main" val="953952999"/>
+      </p:ext>
+    </p:extLst>
+  </p:cSld>
+  <p:clrMapOvr>
+    <a:masterClrMapping/>
+  </p:clrMapOvr>
+</p:sld>
+</file>
+
+<file path=ppt/slides/slide42.xml><?xml version="1.0" encoding="utf-8"?>
+<p:sld xmlns:a="http://schemas.openxmlformats.org/drawingml/2006/main" xmlns:r="http://schemas.openxmlformats.org/officeDocument/2006/relationships" xmlns:p="http://schemas.openxmlformats.org/presentationml/2006/main">
+  <p:cSld>
+    <p:spTree>
+      <p:nvGrpSpPr>
+        <p:cNvPr id="1" name=""/>
+        <p:cNvGrpSpPr/>
+        <p:nvPr/>
+      </p:nvGrpSpPr>
+      <p:grpSpPr>
+        <a:xfrm>
+          <a:off x="0" y="0"/>
+          <a:ext cx="0" cy="0"/>
+          <a:chOff x="0" y="0"/>
+          <a:chExt cx="0" cy="0"/>
+        </a:xfrm>
+      </p:grpSpPr>
+      <p:sp>
+        <p:nvSpPr>
+          <p:cNvPr id="2" name="Title 1"/>
+          <p:cNvSpPr>
+            <a:spLocks noGrp="1"/>
+          </p:cNvSpPr>
+          <p:nvPr>
+            <p:ph type="title"/>
+          </p:nvPr>
+        </p:nvSpPr>
+        <p:spPr/>
+        <p:txBody>
+          <a:bodyPr/>
+          <a:lstStyle/>
+          <a:p>
+            <a:r>
+              <a:rPr lang="en-US" dirty="0" smtClean="0"/>
+              <a:t>Your final project : topic selection</a:t>
+            </a:r>
+            <a:endParaRPr lang="en-US" dirty="0"/>
+          </a:p>
+        </p:txBody>
+      </p:sp>
+      <p:sp>
+        <p:nvSpPr>
+          <p:cNvPr id="3" name="Content Placeholder 2"/>
+          <p:cNvSpPr>
+            <a:spLocks noGrp="1"/>
+          </p:cNvSpPr>
+          <p:nvPr>
+            <p:ph idx="1"/>
+          </p:nvPr>
+        </p:nvSpPr>
+        <p:spPr/>
+        <p:txBody>
+          <a:bodyPr/>
+          <a:lstStyle/>
+          <a:p>
+            <a:r>
+              <a:rPr lang="en-US" dirty="0" smtClean="0"/>
               <a:t>Goal: </a:t>
             </a:r>
             <a:r>
@@ -16775,7 +19032,7 @@
 </p:sld>
 </file>
 
-<file path=ppt/slides/slide37.xml><?xml version="1.0" encoding="utf-8"?>
+<file path=ppt/slides/slide43.xml><?xml version="1.0" encoding="utf-8"?>
 <p:sld xmlns:a="http://schemas.openxmlformats.org/drawingml/2006/main" xmlns:r="http://schemas.openxmlformats.org/officeDocument/2006/relationships" xmlns:p="http://schemas.openxmlformats.org/presentationml/2006/main">
   <p:cSld>
     <p:spTree>
@@ -17158,863 +19415,6 @@
 </p:sld>
 </file>
 
-<file path=ppt/slides/slide4.xml><?xml version="1.0" encoding="utf-8"?>
-<p:sld xmlns:a="http://schemas.openxmlformats.org/drawingml/2006/main" xmlns:r="http://schemas.openxmlformats.org/officeDocument/2006/relationships" xmlns:p="http://schemas.openxmlformats.org/presentationml/2006/main">
-  <p:cSld>
-    <p:spTree>
-      <p:nvGrpSpPr>
-        <p:cNvPr id="1" name=""/>
-        <p:cNvGrpSpPr/>
-        <p:nvPr/>
-      </p:nvGrpSpPr>
-      <p:grpSpPr>
-        <a:xfrm>
-          <a:off x="0" y="0"/>
-          <a:ext cx="0" cy="0"/>
-          <a:chOff x="0" y="0"/>
-          <a:chExt cx="0" cy="0"/>
-        </a:xfrm>
-      </p:grpSpPr>
-      <p:sp>
-        <p:nvSpPr>
-          <p:cNvPr id="2" name="Title 1"/>
-          <p:cNvSpPr>
-            <a:spLocks noGrp="1"/>
-          </p:cNvSpPr>
-          <p:nvPr>
-            <p:ph type="title"/>
-          </p:nvPr>
-        </p:nvSpPr>
-        <p:spPr/>
-        <p:txBody>
-          <a:bodyPr/>
-          <a:lstStyle/>
-          <a:p>
-            <a:r>
-              <a:rPr lang="en-US" dirty="0" smtClean="0"/>
-              <a:t>Anatomy of a </a:t>
-            </a:r>
-            <a:r>
-              <a:rPr lang="en-US" dirty="0" err="1" smtClean="0"/>
-              <a:t>matplotlib</a:t>
-            </a:r>
-            <a:r>
-              <a:rPr lang="en-US" dirty="0" smtClean="0"/>
-              <a:t> plot</a:t>
-            </a:r>
-            <a:endParaRPr lang="en-US" dirty="0"/>
-          </a:p>
-        </p:txBody>
-      </p:sp>
-      <p:sp>
-        <p:nvSpPr>
-          <p:cNvPr id="3" name="Content Placeholder 2"/>
-          <p:cNvSpPr>
-            <a:spLocks noGrp="1"/>
-          </p:cNvSpPr>
-          <p:nvPr>
-            <p:ph idx="1"/>
-          </p:nvPr>
-        </p:nvSpPr>
-        <p:spPr>
-          <a:xfrm>
-            <a:off x="838200" y="1559860"/>
-            <a:ext cx="10515600" cy="5298140"/>
-          </a:xfrm>
-        </p:spPr>
-        <p:txBody>
-          <a:bodyPr>
-            <a:normAutofit fontScale="92500" lnSpcReduction="20000"/>
-          </a:bodyPr>
-          <a:lstStyle/>
-          <a:p>
-            <a:pPr marL="0" indent="0">
-              <a:lnSpc>
-                <a:spcPct val="100000"/>
-              </a:lnSpc>
-              <a:spcBef>
-                <a:spcPts val="0"/>
-              </a:spcBef>
-              <a:buNone/>
-            </a:pPr>
-            <a:r>
-              <a:rPr lang="en-US" dirty="0" smtClean="0">
-                <a:solidFill>
-                  <a:schemeClr val="bg1">
-                    <a:lumMod val="75000"/>
-                  </a:schemeClr>
-                </a:solidFill>
-                <a:latin typeface="Courier New" charset="0"/>
-                <a:ea typeface="Courier New" charset="0"/>
-                <a:cs typeface="Courier New" charset="0"/>
-              </a:rPr>
-              <a:t>import </a:t>
-            </a:r>
-            <a:r>
-              <a:rPr lang="en-US" dirty="0" err="1" smtClean="0">
-                <a:solidFill>
-                  <a:schemeClr val="bg1">
-                    <a:lumMod val="75000"/>
-                  </a:schemeClr>
-                </a:solidFill>
-                <a:latin typeface="Courier New" charset="0"/>
-                <a:ea typeface="Courier New" charset="0"/>
-                <a:cs typeface="Courier New" charset="0"/>
-              </a:rPr>
-              <a:t>numpy</a:t>
-            </a:r>
-            <a:r>
-              <a:rPr lang="en-US" dirty="0" smtClean="0">
-                <a:solidFill>
-                  <a:schemeClr val="bg1">
-                    <a:lumMod val="75000"/>
-                  </a:schemeClr>
-                </a:solidFill>
-                <a:latin typeface="Courier New" charset="0"/>
-                <a:ea typeface="Courier New" charset="0"/>
-                <a:cs typeface="Courier New" charset="0"/>
-              </a:rPr>
-              <a:t> as np </a:t>
-            </a:r>
-          </a:p>
-          <a:p>
-            <a:pPr marL="0" indent="0">
-              <a:lnSpc>
-                <a:spcPct val="100000"/>
-              </a:lnSpc>
-              <a:spcBef>
-                <a:spcPts val="0"/>
-              </a:spcBef>
-              <a:buNone/>
-            </a:pPr>
-            <a:r>
-              <a:rPr lang="en-US" dirty="0" smtClean="0">
-                <a:solidFill>
-                  <a:schemeClr val="bg1">
-                    <a:lumMod val="75000"/>
-                  </a:schemeClr>
-                </a:solidFill>
-                <a:latin typeface="Courier New" charset="0"/>
-                <a:ea typeface="Courier New" charset="0"/>
-                <a:cs typeface="Courier New" charset="0"/>
-              </a:rPr>
-              <a:t>import </a:t>
-            </a:r>
-            <a:r>
-              <a:rPr lang="en-US" dirty="0" err="1" smtClean="0">
-                <a:solidFill>
-                  <a:schemeClr val="bg1">
-                    <a:lumMod val="75000"/>
-                  </a:schemeClr>
-                </a:solidFill>
-                <a:latin typeface="Courier New" charset="0"/>
-                <a:ea typeface="Courier New" charset="0"/>
-                <a:cs typeface="Courier New" charset="0"/>
-              </a:rPr>
-              <a:t>matplotlib.pyplot</a:t>
-            </a:r>
-            <a:r>
-              <a:rPr lang="en-US" dirty="0" smtClean="0">
-                <a:solidFill>
-                  <a:schemeClr val="bg1">
-                    <a:lumMod val="75000"/>
-                  </a:schemeClr>
-                </a:solidFill>
-                <a:latin typeface="Courier New" charset="0"/>
-                <a:ea typeface="Courier New" charset="0"/>
-                <a:cs typeface="Courier New" charset="0"/>
-              </a:rPr>
-              <a:t> as </a:t>
-            </a:r>
-            <a:r>
-              <a:rPr lang="en-US" dirty="0" err="1" smtClean="0">
-                <a:solidFill>
-                  <a:schemeClr val="bg1">
-                    <a:lumMod val="75000"/>
-                  </a:schemeClr>
-                </a:solidFill>
-                <a:latin typeface="Courier New" charset="0"/>
-                <a:ea typeface="Courier New" charset="0"/>
-                <a:cs typeface="Courier New" charset="0"/>
-              </a:rPr>
-              <a:t>plt</a:t>
-            </a:r>
-            <a:r>
-              <a:rPr lang="en-US" dirty="0" smtClean="0">
-                <a:solidFill>
-                  <a:schemeClr val="bg1">
-                    <a:lumMod val="75000"/>
-                  </a:schemeClr>
-                </a:solidFill>
-                <a:latin typeface="Courier New" charset="0"/>
-                <a:ea typeface="Courier New" charset="0"/>
-                <a:cs typeface="Courier New" charset="0"/>
-              </a:rPr>
-              <a:t> </a:t>
-            </a:r>
-          </a:p>
-          <a:p>
-            <a:pPr marL="0" indent="0">
-              <a:lnSpc>
-                <a:spcPct val="100000"/>
-              </a:lnSpc>
-              <a:spcBef>
-                <a:spcPts val="0"/>
-              </a:spcBef>
-              <a:buNone/>
-            </a:pPr>
-            <a:r>
-              <a:rPr lang="en-US" dirty="0" smtClean="0">
-                <a:solidFill>
-                  <a:schemeClr val="bg1">
-                    <a:lumMod val="75000"/>
-                  </a:schemeClr>
-                </a:solidFill>
-                <a:latin typeface="Courier New" charset="0"/>
-                <a:ea typeface="Courier New" charset="0"/>
-                <a:cs typeface="Courier New" charset="0"/>
-              </a:rPr>
-              <a:t>x1 = </a:t>
-            </a:r>
-            <a:r>
-              <a:rPr lang="en-US" dirty="0" err="1" smtClean="0">
-                <a:solidFill>
-                  <a:schemeClr val="bg1">
-                    <a:lumMod val="75000"/>
-                  </a:schemeClr>
-                </a:solidFill>
-                <a:latin typeface="Courier New" charset="0"/>
-                <a:ea typeface="Courier New" charset="0"/>
-                <a:cs typeface="Courier New" charset="0"/>
-              </a:rPr>
-              <a:t>np.linspace</a:t>
-            </a:r>
-            <a:r>
-              <a:rPr lang="en-US" dirty="0" smtClean="0">
-                <a:solidFill>
-                  <a:schemeClr val="bg1">
-                    <a:lumMod val="75000"/>
-                  </a:schemeClr>
-                </a:solidFill>
-                <a:latin typeface="Courier New" charset="0"/>
-                <a:ea typeface="Courier New" charset="0"/>
-                <a:cs typeface="Courier New" charset="0"/>
-              </a:rPr>
-              <a:t>(0.0, 5.0) </a:t>
-            </a:r>
-          </a:p>
-          <a:p>
-            <a:pPr marL="0" indent="0">
-              <a:lnSpc>
-                <a:spcPct val="100000"/>
-              </a:lnSpc>
-              <a:spcBef>
-                <a:spcPts val="0"/>
-              </a:spcBef>
-              <a:buNone/>
-            </a:pPr>
-            <a:r>
-              <a:rPr lang="en-US" dirty="0" smtClean="0">
-                <a:solidFill>
-                  <a:schemeClr val="bg1">
-                    <a:lumMod val="75000"/>
-                  </a:schemeClr>
-                </a:solidFill>
-                <a:latin typeface="Courier New" charset="0"/>
-                <a:ea typeface="Courier New" charset="0"/>
-                <a:cs typeface="Courier New" charset="0"/>
-              </a:rPr>
-              <a:t>x2 = </a:t>
-            </a:r>
-            <a:r>
-              <a:rPr lang="en-US" dirty="0" err="1" smtClean="0">
-                <a:solidFill>
-                  <a:schemeClr val="bg1">
-                    <a:lumMod val="75000"/>
-                  </a:schemeClr>
-                </a:solidFill>
-                <a:latin typeface="Courier New" charset="0"/>
-                <a:ea typeface="Courier New" charset="0"/>
-                <a:cs typeface="Courier New" charset="0"/>
-              </a:rPr>
-              <a:t>np.linspace</a:t>
-            </a:r>
-            <a:r>
-              <a:rPr lang="en-US" dirty="0" smtClean="0">
-                <a:solidFill>
-                  <a:schemeClr val="bg1">
-                    <a:lumMod val="75000"/>
-                  </a:schemeClr>
-                </a:solidFill>
-                <a:latin typeface="Courier New" charset="0"/>
-                <a:ea typeface="Courier New" charset="0"/>
-                <a:cs typeface="Courier New" charset="0"/>
-              </a:rPr>
-              <a:t>(0.0, 2.0) </a:t>
-            </a:r>
-          </a:p>
-          <a:p>
-            <a:pPr marL="0" indent="0">
-              <a:lnSpc>
-                <a:spcPct val="100000"/>
-              </a:lnSpc>
-              <a:spcBef>
-                <a:spcPts val="0"/>
-              </a:spcBef>
-              <a:buNone/>
-            </a:pPr>
-            <a:r>
-              <a:rPr lang="en-US" dirty="0" smtClean="0">
-                <a:solidFill>
-                  <a:schemeClr val="bg1">
-                    <a:lumMod val="75000"/>
-                  </a:schemeClr>
-                </a:solidFill>
-                <a:latin typeface="Courier New" charset="0"/>
-                <a:ea typeface="Courier New" charset="0"/>
-                <a:cs typeface="Courier New" charset="0"/>
-              </a:rPr>
-              <a:t>y1 = </a:t>
-            </a:r>
-            <a:r>
-              <a:rPr lang="en-US" dirty="0" err="1" smtClean="0">
-                <a:solidFill>
-                  <a:schemeClr val="bg1">
-                    <a:lumMod val="75000"/>
-                  </a:schemeClr>
-                </a:solidFill>
-                <a:latin typeface="Courier New" charset="0"/>
-                <a:ea typeface="Courier New" charset="0"/>
-                <a:cs typeface="Courier New" charset="0"/>
-              </a:rPr>
-              <a:t>np.cos</a:t>
-            </a:r>
-            <a:r>
-              <a:rPr lang="en-US" dirty="0" smtClean="0">
-                <a:solidFill>
-                  <a:schemeClr val="bg1">
-                    <a:lumMod val="75000"/>
-                  </a:schemeClr>
-                </a:solidFill>
-                <a:latin typeface="Courier New" charset="0"/>
-                <a:ea typeface="Courier New" charset="0"/>
-                <a:cs typeface="Courier New" charset="0"/>
-              </a:rPr>
-              <a:t>(2 * </a:t>
-            </a:r>
-            <a:r>
-              <a:rPr lang="en-US" dirty="0" err="1" smtClean="0">
-                <a:solidFill>
-                  <a:schemeClr val="bg1">
-                    <a:lumMod val="75000"/>
-                  </a:schemeClr>
-                </a:solidFill>
-                <a:latin typeface="Courier New" charset="0"/>
-                <a:ea typeface="Courier New" charset="0"/>
-                <a:cs typeface="Courier New" charset="0"/>
-              </a:rPr>
-              <a:t>np.pi</a:t>
-            </a:r>
-            <a:r>
-              <a:rPr lang="en-US" dirty="0" smtClean="0">
-                <a:solidFill>
-                  <a:schemeClr val="bg1">
-                    <a:lumMod val="75000"/>
-                  </a:schemeClr>
-                </a:solidFill>
-                <a:latin typeface="Courier New" charset="0"/>
-                <a:ea typeface="Courier New" charset="0"/>
-                <a:cs typeface="Courier New" charset="0"/>
-              </a:rPr>
-              <a:t> * x1) * </a:t>
-            </a:r>
-            <a:r>
-              <a:rPr lang="en-US" dirty="0" err="1" smtClean="0">
-                <a:solidFill>
-                  <a:schemeClr val="bg1">
-                    <a:lumMod val="75000"/>
-                  </a:schemeClr>
-                </a:solidFill>
-                <a:latin typeface="Courier New" charset="0"/>
-                <a:ea typeface="Courier New" charset="0"/>
-                <a:cs typeface="Courier New" charset="0"/>
-              </a:rPr>
-              <a:t>np.exp</a:t>
-            </a:r>
-            <a:r>
-              <a:rPr lang="en-US" dirty="0" smtClean="0">
-                <a:solidFill>
-                  <a:schemeClr val="bg1">
-                    <a:lumMod val="75000"/>
-                  </a:schemeClr>
-                </a:solidFill>
-                <a:latin typeface="Courier New" charset="0"/>
-                <a:ea typeface="Courier New" charset="0"/>
-                <a:cs typeface="Courier New" charset="0"/>
-              </a:rPr>
-              <a:t>(-x1) </a:t>
-            </a:r>
-          </a:p>
-          <a:p>
-            <a:pPr marL="0" indent="0">
-              <a:lnSpc>
-                <a:spcPct val="100000"/>
-              </a:lnSpc>
-              <a:spcBef>
-                <a:spcPts val="0"/>
-              </a:spcBef>
-              <a:buNone/>
-            </a:pPr>
-            <a:r>
-              <a:rPr lang="en-US" dirty="0" smtClean="0">
-                <a:solidFill>
-                  <a:schemeClr val="bg1">
-                    <a:lumMod val="75000"/>
-                  </a:schemeClr>
-                </a:solidFill>
-                <a:latin typeface="Courier New" charset="0"/>
-                <a:ea typeface="Courier New" charset="0"/>
-                <a:cs typeface="Courier New" charset="0"/>
-              </a:rPr>
-              <a:t>y2 = </a:t>
-            </a:r>
-            <a:r>
-              <a:rPr lang="en-US" dirty="0" err="1" smtClean="0">
-                <a:solidFill>
-                  <a:schemeClr val="bg1">
-                    <a:lumMod val="75000"/>
-                  </a:schemeClr>
-                </a:solidFill>
-                <a:latin typeface="Courier New" charset="0"/>
-                <a:ea typeface="Courier New" charset="0"/>
-                <a:cs typeface="Courier New" charset="0"/>
-              </a:rPr>
-              <a:t>np.cos</a:t>
-            </a:r>
-            <a:r>
-              <a:rPr lang="en-US" dirty="0" smtClean="0">
-                <a:solidFill>
-                  <a:schemeClr val="bg1">
-                    <a:lumMod val="75000"/>
-                  </a:schemeClr>
-                </a:solidFill>
-                <a:latin typeface="Courier New" charset="0"/>
-                <a:ea typeface="Courier New" charset="0"/>
-                <a:cs typeface="Courier New" charset="0"/>
-              </a:rPr>
-              <a:t>(2 * </a:t>
-            </a:r>
-            <a:r>
-              <a:rPr lang="en-US" dirty="0" err="1" smtClean="0">
-                <a:solidFill>
-                  <a:schemeClr val="bg1">
-                    <a:lumMod val="75000"/>
-                  </a:schemeClr>
-                </a:solidFill>
-                <a:latin typeface="Courier New" charset="0"/>
-                <a:ea typeface="Courier New" charset="0"/>
-                <a:cs typeface="Courier New" charset="0"/>
-              </a:rPr>
-              <a:t>np.pi</a:t>
-            </a:r>
-            <a:r>
-              <a:rPr lang="en-US" dirty="0" smtClean="0">
-                <a:solidFill>
-                  <a:schemeClr val="bg1">
-                    <a:lumMod val="75000"/>
-                  </a:schemeClr>
-                </a:solidFill>
-                <a:latin typeface="Courier New" charset="0"/>
-                <a:ea typeface="Courier New" charset="0"/>
-                <a:cs typeface="Courier New" charset="0"/>
-              </a:rPr>
-              <a:t> * x2) </a:t>
-            </a:r>
-          </a:p>
-          <a:p>
-            <a:pPr marL="0" indent="0">
-              <a:lnSpc>
-                <a:spcPct val="100000"/>
-              </a:lnSpc>
-              <a:spcBef>
-                <a:spcPts val="0"/>
-              </a:spcBef>
-              <a:buNone/>
-            </a:pPr>
-            <a:r>
-              <a:rPr lang="en-US" dirty="0" err="1" smtClean="0">
-                <a:solidFill>
-                  <a:schemeClr val="bg1">
-                    <a:lumMod val="75000"/>
-                  </a:schemeClr>
-                </a:solidFill>
-                <a:latin typeface="Courier New" charset="0"/>
-                <a:ea typeface="Courier New" charset="0"/>
-                <a:cs typeface="Courier New" charset="0"/>
-              </a:rPr>
-              <a:t>plt.subplot</a:t>
-            </a:r>
-            <a:r>
-              <a:rPr lang="en-US" dirty="0" smtClean="0">
-                <a:solidFill>
-                  <a:schemeClr val="bg1">
-                    <a:lumMod val="75000"/>
-                  </a:schemeClr>
-                </a:solidFill>
-                <a:latin typeface="Courier New" charset="0"/>
-                <a:ea typeface="Courier New" charset="0"/>
-                <a:cs typeface="Courier New" charset="0"/>
-              </a:rPr>
-              <a:t>(2, 1, 1) </a:t>
-            </a:r>
-          </a:p>
-          <a:p>
-            <a:pPr marL="0" indent="0">
-              <a:lnSpc>
-                <a:spcPct val="100000"/>
-              </a:lnSpc>
-              <a:spcBef>
-                <a:spcPts val="0"/>
-              </a:spcBef>
-              <a:buNone/>
-            </a:pPr>
-            <a:r>
-              <a:rPr lang="en-US" dirty="0" err="1" smtClean="0">
-                <a:solidFill>
-                  <a:schemeClr val="bg1">
-                    <a:lumMod val="75000"/>
-                  </a:schemeClr>
-                </a:solidFill>
-                <a:latin typeface="Courier New" charset="0"/>
-                <a:ea typeface="Courier New" charset="0"/>
-                <a:cs typeface="Courier New" charset="0"/>
-              </a:rPr>
-              <a:t>plt.plot</a:t>
-            </a:r>
-            <a:r>
-              <a:rPr lang="en-US" dirty="0" smtClean="0">
-                <a:solidFill>
-                  <a:schemeClr val="bg1">
-                    <a:lumMod val="75000"/>
-                  </a:schemeClr>
-                </a:solidFill>
-                <a:latin typeface="Courier New" charset="0"/>
-                <a:ea typeface="Courier New" charset="0"/>
-                <a:cs typeface="Courier New" charset="0"/>
-              </a:rPr>
-              <a:t>(x1, y1, '</a:t>
-            </a:r>
-            <a:r>
-              <a:rPr lang="en-US" dirty="0" err="1" smtClean="0">
-                <a:solidFill>
-                  <a:schemeClr val="bg1">
-                    <a:lumMod val="75000"/>
-                  </a:schemeClr>
-                </a:solidFill>
-                <a:latin typeface="Courier New" charset="0"/>
-                <a:ea typeface="Courier New" charset="0"/>
-                <a:cs typeface="Courier New" charset="0"/>
-              </a:rPr>
-              <a:t>ko</a:t>
-            </a:r>
-            <a:r>
-              <a:rPr lang="en-US" dirty="0" smtClean="0">
-                <a:solidFill>
-                  <a:schemeClr val="bg1">
-                    <a:lumMod val="75000"/>
-                  </a:schemeClr>
-                </a:solidFill>
-                <a:latin typeface="Courier New" charset="0"/>
-                <a:ea typeface="Courier New" charset="0"/>
-                <a:cs typeface="Courier New" charset="0"/>
-              </a:rPr>
-              <a:t>-') </a:t>
-            </a:r>
-          </a:p>
-          <a:p>
-            <a:pPr marL="0" indent="0">
-              <a:lnSpc>
-                <a:spcPct val="100000"/>
-              </a:lnSpc>
-              <a:spcBef>
-                <a:spcPts val="0"/>
-              </a:spcBef>
-              <a:buNone/>
-            </a:pPr>
-            <a:r>
-              <a:rPr lang="en-US" dirty="0" err="1" smtClean="0">
-                <a:solidFill>
-                  <a:schemeClr val="bg1">
-                    <a:lumMod val="75000"/>
-                  </a:schemeClr>
-                </a:solidFill>
-                <a:latin typeface="Courier New" charset="0"/>
-                <a:ea typeface="Courier New" charset="0"/>
-                <a:cs typeface="Courier New" charset="0"/>
-              </a:rPr>
-              <a:t>plt.title</a:t>
-            </a:r>
-            <a:r>
-              <a:rPr lang="en-US" dirty="0" smtClean="0">
-                <a:solidFill>
-                  <a:schemeClr val="bg1">
-                    <a:lumMod val="75000"/>
-                  </a:schemeClr>
-                </a:solidFill>
-                <a:latin typeface="Courier New" charset="0"/>
-                <a:ea typeface="Courier New" charset="0"/>
-                <a:cs typeface="Courier New" charset="0"/>
-              </a:rPr>
-              <a:t>('A tale of 2 subplots') </a:t>
-            </a:r>
-          </a:p>
-          <a:p>
-            <a:pPr marL="0" indent="0">
-              <a:lnSpc>
-                <a:spcPct val="100000"/>
-              </a:lnSpc>
-              <a:spcBef>
-                <a:spcPts val="0"/>
-              </a:spcBef>
-              <a:buNone/>
-            </a:pPr>
-            <a:r>
-              <a:rPr lang="en-US" dirty="0" err="1" smtClean="0">
-                <a:solidFill>
-                  <a:schemeClr val="bg1">
-                    <a:lumMod val="75000"/>
-                  </a:schemeClr>
-                </a:solidFill>
-                <a:latin typeface="Courier New" charset="0"/>
-                <a:ea typeface="Courier New" charset="0"/>
-                <a:cs typeface="Courier New" charset="0"/>
-              </a:rPr>
-              <a:t>plt.ylabel</a:t>
-            </a:r>
-            <a:r>
-              <a:rPr lang="en-US" dirty="0" smtClean="0">
-                <a:solidFill>
-                  <a:schemeClr val="bg1">
-                    <a:lumMod val="75000"/>
-                  </a:schemeClr>
-                </a:solidFill>
-                <a:latin typeface="Courier New" charset="0"/>
-                <a:ea typeface="Courier New" charset="0"/>
-                <a:cs typeface="Courier New" charset="0"/>
-              </a:rPr>
-              <a:t>('Damped oscillation')</a:t>
-            </a:r>
-          </a:p>
-          <a:p>
-            <a:pPr marL="0" indent="0">
-              <a:lnSpc>
-                <a:spcPct val="100000"/>
-              </a:lnSpc>
-              <a:spcBef>
-                <a:spcPts val="0"/>
-              </a:spcBef>
-              <a:buNone/>
-            </a:pPr>
-            <a:r>
-              <a:rPr lang="en-US" dirty="0" err="1" smtClean="0">
-                <a:solidFill>
-                  <a:schemeClr val="bg1">
-                    <a:lumMod val="75000"/>
-                  </a:schemeClr>
-                </a:solidFill>
-                <a:latin typeface="Courier New" charset="0"/>
-                <a:ea typeface="Courier New" charset="0"/>
-                <a:cs typeface="Courier New" charset="0"/>
-              </a:rPr>
-              <a:t>plt.subplot</a:t>
-            </a:r>
-            <a:r>
-              <a:rPr lang="en-US" dirty="0" smtClean="0">
-                <a:solidFill>
-                  <a:schemeClr val="bg1">
-                    <a:lumMod val="75000"/>
-                  </a:schemeClr>
-                </a:solidFill>
-                <a:latin typeface="Courier New" charset="0"/>
-                <a:ea typeface="Courier New" charset="0"/>
-                <a:cs typeface="Courier New" charset="0"/>
-              </a:rPr>
-              <a:t>(2, 1, 2) </a:t>
-            </a:r>
-          </a:p>
-          <a:p>
-            <a:pPr marL="0" indent="0">
-              <a:lnSpc>
-                <a:spcPct val="100000"/>
-              </a:lnSpc>
-              <a:spcBef>
-                <a:spcPts val="0"/>
-              </a:spcBef>
-              <a:buNone/>
-            </a:pPr>
-            <a:r>
-              <a:rPr lang="en-US" dirty="0" err="1" smtClean="0">
-                <a:solidFill>
-                  <a:schemeClr val="bg1">
-                    <a:lumMod val="75000"/>
-                  </a:schemeClr>
-                </a:solidFill>
-                <a:latin typeface="Courier New" charset="0"/>
-                <a:ea typeface="Courier New" charset="0"/>
-                <a:cs typeface="Courier New" charset="0"/>
-              </a:rPr>
-              <a:t>plt.plot</a:t>
-            </a:r>
-            <a:r>
-              <a:rPr lang="en-US" dirty="0" smtClean="0">
-                <a:solidFill>
-                  <a:schemeClr val="bg1">
-                    <a:lumMod val="75000"/>
-                  </a:schemeClr>
-                </a:solidFill>
-                <a:latin typeface="Courier New" charset="0"/>
-                <a:ea typeface="Courier New" charset="0"/>
-                <a:cs typeface="Courier New" charset="0"/>
-              </a:rPr>
-              <a:t>(x2, y2, 'r.-') </a:t>
-            </a:r>
-          </a:p>
-          <a:p>
-            <a:pPr marL="0" indent="0">
-              <a:lnSpc>
-                <a:spcPct val="100000"/>
-              </a:lnSpc>
-              <a:spcBef>
-                <a:spcPts val="0"/>
-              </a:spcBef>
-              <a:buNone/>
-            </a:pPr>
-            <a:r>
-              <a:rPr lang="en-US" dirty="0" err="1" smtClean="0">
-                <a:solidFill>
-                  <a:schemeClr val="bg1">
-                    <a:lumMod val="75000"/>
-                  </a:schemeClr>
-                </a:solidFill>
-                <a:latin typeface="Courier New" charset="0"/>
-                <a:ea typeface="Courier New" charset="0"/>
-                <a:cs typeface="Courier New" charset="0"/>
-              </a:rPr>
-              <a:t>plt.xlabel</a:t>
-            </a:r>
-            <a:r>
-              <a:rPr lang="en-US" dirty="0" smtClean="0">
-                <a:solidFill>
-                  <a:schemeClr val="bg1">
-                    <a:lumMod val="75000"/>
-                  </a:schemeClr>
-                </a:solidFill>
-                <a:latin typeface="Courier New" charset="0"/>
-                <a:ea typeface="Courier New" charset="0"/>
-                <a:cs typeface="Courier New" charset="0"/>
-              </a:rPr>
-              <a:t>('time (s)') </a:t>
-            </a:r>
-          </a:p>
-          <a:p>
-            <a:pPr marL="0" indent="0">
-              <a:lnSpc>
-                <a:spcPct val="100000"/>
-              </a:lnSpc>
-              <a:spcBef>
-                <a:spcPts val="0"/>
-              </a:spcBef>
-              <a:buNone/>
-            </a:pPr>
-            <a:r>
-              <a:rPr lang="en-US" dirty="0" err="1" smtClean="0">
-                <a:solidFill>
-                  <a:schemeClr val="bg1">
-                    <a:lumMod val="75000"/>
-                  </a:schemeClr>
-                </a:solidFill>
-                <a:latin typeface="Courier New" charset="0"/>
-                <a:ea typeface="Courier New" charset="0"/>
-                <a:cs typeface="Courier New" charset="0"/>
-              </a:rPr>
-              <a:t>plt.ylabel</a:t>
-            </a:r>
-            <a:r>
-              <a:rPr lang="en-US" dirty="0" smtClean="0">
-                <a:solidFill>
-                  <a:schemeClr val="bg1">
-                    <a:lumMod val="75000"/>
-                  </a:schemeClr>
-                </a:solidFill>
-                <a:latin typeface="Courier New" charset="0"/>
-                <a:ea typeface="Courier New" charset="0"/>
-                <a:cs typeface="Courier New" charset="0"/>
-              </a:rPr>
-              <a:t>('Undamped') </a:t>
-            </a:r>
-          </a:p>
-          <a:p>
-            <a:pPr marL="0" indent="0">
-              <a:lnSpc>
-                <a:spcPct val="100000"/>
-              </a:lnSpc>
-              <a:spcBef>
-                <a:spcPts val="0"/>
-              </a:spcBef>
-              <a:buNone/>
-            </a:pPr>
-            <a:r>
-              <a:rPr lang="en-US" dirty="0" err="1" smtClean="0">
-                <a:solidFill>
-                  <a:schemeClr val="bg1">
-                    <a:lumMod val="75000"/>
-                  </a:schemeClr>
-                </a:solidFill>
-                <a:latin typeface="Courier New" charset="0"/>
-                <a:ea typeface="Courier New" charset="0"/>
-                <a:cs typeface="Courier New" charset="0"/>
-              </a:rPr>
-              <a:t>plt.show</a:t>
-            </a:r>
-            <a:r>
-              <a:rPr lang="en-US" dirty="0" smtClean="0">
-                <a:solidFill>
-                  <a:schemeClr val="bg1">
-                    <a:lumMod val="75000"/>
-                  </a:schemeClr>
-                </a:solidFill>
-                <a:latin typeface="Courier New" charset="0"/>
-                <a:ea typeface="Courier New" charset="0"/>
-                <a:cs typeface="Courier New" charset="0"/>
-              </a:rPr>
-              <a:t>()</a:t>
-            </a:r>
-            <a:endParaRPr lang="en-US" dirty="0">
-              <a:solidFill>
-                <a:schemeClr val="bg1">
-                  <a:lumMod val="75000"/>
-                </a:schemeClr>
-              </a:solidFill>
-              <a:latin typeface="Courier New" charset="0"/>
-              <a:ea typeface="Courier New" charset="0"/>
-              <a:cs typeface="Courier New" charset="0"/>
-            </a:endParaRPr>
-          </a:p>
-        </p:txBody>
-      </p:sp>
-    </p:spTree>
-    <p:extLst>
-      <p:ext uri="{BB962C8B-B14F-4D97-AF65-F5344CB8AC3E}">
-        <p14:creationId xmlns:p14="http://schemas.microsoft.com/office/powerpoint/2010/main" val="927731680"/>
-      </p:ext>
-    </p:extLst>
-  </p:cSld>
-  <p:clrMapOvr>
-    <a:masterClrMapping/>
-  </p:clrMapOvr>
-</p:sld>
-</file>
-
 <file path=ppt/slides/slide5.xml><?xml version="1.0" encoding="utf-8"?>
 <p:sld xmlns:a="http://schemas.openxmlformats.org/drawingml/2006/main" xmlns:r="http://schemas.openxmlformats.org/officeDocument/2006/relationships" xmlns:p="http://schemas.openxmlformats.org/presentationml/2006/main">
   <p:cSld>

</xml_diff>